<commit_message>
add data diff for excel
</commit_message>
<xml_diff>
--- a/a.pptx
+++ b/a.pptx
@@ -7,7 +7,6 @@
   <p:sldIdLst>
     <p:sldId id="258" r:id="rId3"/>
     <p:sldId id="259" r:id="rId4"/>
-    <p:sldId id="260" r:id="rId5"/>
   </p:sldIdLst>
   <p:sldSz cx="12192000" cy="6858000"/>
   <p:notesSz cx="6858000" cy="9144000"/>
@@ -7492,2174 +7491,6 @@
 </p:sld>
 </file>
 
-<file path=ppt/slides/slide3.xml><?xml version="1.0" encoding="utf-8"?>
-<p:sld xmlns:a="http://schemas.openxmlformats.org/drawingml/2006/main" xmlns:r="http://schemas.openxmlformats.org/officeDocument/2006/relationships" xmlns:p="http://schemas.openxmlformats.org/presentationml/2006/main">
-  <p:cSld>
-    <p:spTree>
-      <p:nvGrpSpPr>
-        <p:cNvPr id="1" name=""/>
-        <p:cNvGrpSpPr/>
-        <p:nvPr/>
-      </p:nvGrpSpPr>
-      <p:grpSpPr>
-        <a:xfrm>
-          <a:off x="0" y="0"/>
-          <a:ext cx="0" cy="0"/>
-          <a:chOff x="0" y="0"/>
-          <a:chExt cx="0" cy="0"/>
-        </a:xfrm>
-      </p:grpSpPr>
-      <p:graphicFrame>
-        <p:nvGraphicFramePr>
-          <p:cNvPr id="4" name="表格 4"/>
-          <p:cNvGraphicFramePr>
-            <a:graphicFrameLocks noGrp="1"/>
-          </p:cNvGraphicFramePr>
-          <p:nvPr>
-            <p:ph idx="1"/>
-            <p:custDataLst>
-              <p:tags r:id="rId1"/>
-            </p:custDataLst>
-          </p:nvPr>
-        </p:nvGraphicFramePr>
-        <p:xfrm>
-          <a:off x="166618" y="596267"/>
-          <a:ext cx="3993932" cy="6061798"/>
-        </p:xfrm>
-        <a:graphic>
-          <a:graphicData uri="http://schemas.openxmlformats.org/drawingml/2006/table">
-            <a:tbl>
-              <a:tblPr firstRow="1" bandRow="1">
-                <a:tableStyleId>{2D5ABB26-0587-4C30-8999-92F81FD0307C}</a:tableStyleId>
-              </a:tblPr>
-              <a:tblGrid>
-                <a:gridCol w="962935"/>
-                <a:gridCol w="3030997"/>
-              </a:tblGrid>
-              <a:tr h="320791">
-                <a:tc>
-                  <a:txBody>
-                    <a:bodyPr/>
-                    <a:lstStyle/>
-                    <a:p>
-                      <a:r>
-                        <a:rPr lang="en-US" altLang="zh-CN" sz="900" b="0" i="0" dirty="0">
-                          <a:latin typeface="Arial" panose="020B0604020202090204" pitchFamily="34" charset="0"/>
-                          <a:ea typeface="宋体" panose="02010600030101010101" pitchFamily="2" charset="-122"/>
-                          <a:cs typeface="Arial" panose="020B0604020202090204" pitchFamily="34" charset="0"/>
-                        </a:rPr>
-                        <a:t>SPC</a:t>
-                      </a:r>
-                      <a:endParaRPr lang="zh-CN" altLang="en-US" sz="900" b="0" i="0" dirty="0">
-                        <a:latin typeface="Arial" panose="020B0604020202090204" pitchFamily="34" charset="0"/>
-                        <a:ea typeface="宋体" panose="02010600030101010101" pitchFamily="2" charset="-122"/>
-                        <a:cs typeface="Arial" panose="020B0604020202090204" pitchFamily="34" charset="0"/>
-                      </a:endParaRPr>
-                    </a:p>
-                  </a:txBody>
-                  <a:tcPr>
-                    <a:lnL w="6350" cap="flat" cmpd="sng" algn="ctr">
-                      <a:solidFill>
-                        <a:schemeClr val="tx1"/>
-                      </a:solidFill>
-                      <a:prstDash val="solid"/>
-                      <a:round/>
-                      <a:headEnd type="none" w="med" len="med"/>
-                      <a:tailEnd type="none" w="med" len="med"/>
-                    </a:lnL>
-                    <a:lnR w="6350" cap="flat" cmpd="sng" algn="ctr">
-                      <a:solidFill>
-                        <a:schemeClr val="tx1"/>
-                      </a:solidFill>
-                      <a:prstDash val="solid"/>
-                      <a:round/>
-                      <a:headEnd type="none" w="med" len="med"/>
-                      <a:tailEnd type="none" w="med" len="med"/>
-                    </a:lnR>
-                    <a:lnT w="6350" cap="flat" cmpd="sng" algn="ctr">
-                      <a:solidFill>
-                        <a:schemeClr val="tx1"/>
-                      </a:solidFill>
-                      <a:prstDash val="solid"/>
-                      <a:round/>
-                      <a:headEnd type="none" w="med" len="med"/>
-                      <a:tailEnd type="none" w="med" len="med"/>
-                    </a:lnT>
-                    <a:lnB w="6350" cap="flat" cmpd="sng" algn="ctr">
-                      <a:solidFill>
-                        <a:schemeClr val="tx1"/>
-                      </a:solidFill>
-                      <a:prstDash val="solid"/>
-                      <a:round/>
-                      <a:headEnd type="none" w="med" len="med"/>
-                      <a:tailEnd type="none" w="med" len="med"/>
-                    </a:lnB>
-                    <a:lnTlToBr w="12700" cmpd="sng">
-                      <a:noFill/>
-                      <a:prstDash val="solid"/>
-                    </a:lnTlToBr>
-                    <a:lnBlToTr w="12700" cmpd="sng">
-                      <a:noFill/>
-                      <a:prstDash val="solid"/>
-                    </a:lnBlToTr>
-                    <a:solidFill>
-                      <a:schemeClr val="accent5">
-                        <a:lumMod val="60000"/>
-                        <a:lumOff val="40000"/>
-                      </a:schemeClr>
-                    </a:solidFill>
-                  </a:tcPr>
-                </a:tc>
-                <a:tc>
-                  <a:txBody>
-                    <a:bodyPr/>
-                    <a:lstStyle/>
-                    <a:p>
-                      <a:r>
-                        <a:rPr lang="en-US" altLang="zh-CN" sz="900" b="0" i="0" dirty="0">
-                          <a:latin typeface="Arial" panose="020B0604020202090204" pitchFamily="34" charset="0"/>
-                          <a:ea typeface="宋体" panose="02010600030101010101" pitchFamily="2" charset="-122"/>
-                          <a:cs typeface="Arial" panose="020B0604020202090204" pitchFamily="34" charset="0"/>
-                        </a:rPr>
-                        <a:t>EX</a:t>
-                      </a:r>
-                      <a:endParaRPr lang="en-US" altLang="zh-CN" sz="900" b="0" i="0" dirty="0">
-                        <a:latin typeface="Arial" panose="020B0604020202090204" pitchFamily="34" charset="0"/>
-                        <a:ea typeface="宋体" panose="02010600030101010101" pitchFamily="2" charset="-122"/>
-                        <a:cs typeface="Arial" panose="020B0604020202090204" pitchFamily="34" charset="0"/>
-                      </a:endParaRPr>
-                    </a:p>
-                  </a:txBody>
-                  <a:tcPr>
-                    <a:lnL w="6350" cap="flat" cmpd="sng" algn="ctr">
-                      <a:solidFill>
-                        <a:schemeClr val="tx1"/>
-                      </a:solidFill>
-                      <a:prstDash val="solid"/>
-                      <a:round/>
-                      <a:headEnd type="none" w="med" len="med"/>
-                      <a:tailEnd type="none" w="med" len="med"/>
-                    </a:lnL>
-                    <a:lnR w="6350" cap="flat" cmpd="sng" algn="ctr">
-                      <a:solidFill>
-                        <a:schemeClr val="tx1"/>
-                      </a:solidFill>
-                      <a:prstDash val="solid"/>
-                      <a:round/>
-                      <a:headEnd type="none" w="med" len="med"/>
-                      <a:tailEnd type="none" w="med" len="med"/>
-                    </a:lnR>
-                    <a:lnT w="6350" cap="flat" cmpd="sng" algn="ctr">
-                      <a:solidFill>
-                        <a:schemeClr val="tx1"/>
-                      </a:solidFill>
-                      <a:prstDash val="solid"/>
-                      <a:round/>
-                      <a:headEnd type="none" w="med" len="med"/>
-                      <a:tailEnd type="none" w="med" len="med"/>
-                    </a:lnT>
-                    <a:lnB w="6350" cap="flat" cmpd="sng" algn="ctr">
-                      <a:solidFill>
-                        <a:schemeClr val="tx1"/>
-                      </a:solidFill>
-                      <a:prstDash val="solid"/>
-                      <a:round/>
-                      <a:headEnd type="none" w="med" len="med"/>
-                      <a:tailEnd type="none" w="med" len="med"/>
-                    </a:lnB>
-                    <a:lnTlToBr w="12700" cmpd="sng">
-                      <a:noFill/>
-                      <a:prstDash val="solid"/>
-                    </a:lnTlToBr>
-                    <a:lnBlToTr w="12700" cmpd="sng">
-                      <a:noFill/>
-                      <a:prstDash val="solid"/>
-                    </a:lnBlToTr>
-                  </a:tcPr>
-                </a:tc>
-              </a:tr>
-              <a:tr h="320791">
-                <a:tc>
-                  <a:txBody>
-                    <a:bodyPr/>
-                    <a:lstStyle/>
-                    <a:p>
-                      <a:r>
-                        <a:rPr lang="en-US" altLang="zh-CN" sz="900" b="0" i="0" dirty="0">
-                          <a:latin typeface="Arial" panose="020B0604020202090204" pitchFamily="34" charset="0"/>
-                          <a:ea typeface="宋体" panose="02010600030101010101" pitchFamily="2" charset="-122"/>
-                          <a:cs typeface="Arial" panose="020B0604020202090204" pitchFamily="34" charset="0"/>
-                        </a:rPr>
-                        <a:t>FAI</a:t>
-                      </a:r>
-                      <a:endParaRPr lang="zh-CN" altLang="en-US" sz="900" b="0" i="0" dirty="0">
-                        <a:latin typeface="Arial" panose="020B0604020202090204" pitchFamily="34" charset="0"/>
-                        <a:ea typeface="宋体" panose="02010600030101010101" pitchFamily="2" charset="-122"/>
-                        <a:cs typeface="Arial" panose="020B0604020202090204" pitchFamily="34" charset="0"/>
-                      </a:endParaRPr>
-                    </a:p>
-                  </a:txBody>
-                  <a:tcPr>
-                    <a:lnL w="6350" cap="flat" cmpd="sng" algn="ctr">
-                      <a:solidFill>
-                        <a:schemeClr val="tx1"/>
-                      </a:solidFill>
-                      <a:prstDash val="solid"/>
-                      <a:round/>
-                      <a:headEnd type="none" w="med" len="med"/>
-                      <a:tailEnd type="none" w="med" len="med"/>
-                    </a:lnL>
-                    <a:lnR w="6350" cap="flat" cmpd="sng" algn="ctr">
-                      <a:solidFill>
-                        <a:schemeClr val="tx1"/>
-                      </a:solidFill>
-                      <a:prstDash val="solid"/>
-                      <a:round/>
-                      <a:headEnd type="none" w="med" len="med"/>
-                      <a:tailEnd type="none" w="med" len="med"/>
-                    </a:lnR>
-                    <a:lnT w="6350" cap="flat" cmpd="sng" algn="ctr">
-                      <a:solidFill>
-                        <a:schemeClr val="tx1"/>
-                      </a:solidFill>
-                      <a:prstDash val="solid"/>
-                      <a:round/>
-                      <a:headEnd type="none" w="med" len="med"/>
-                      <a:tailEnd type="none" w="med" len="med"/>
-                    </a:lnT>
-                    <a:lnB w="6350" cap="flat" cmpd="sng" algn="ctr">
-                      <a:solidFill>
-                        <a:schemeClr val="tx1"/>
-                      </a:solidFill>
-                      <a:prstDash val="solid"/>
-                      <a:round/>
-                      <a:headEnd type="none" w="med" len="med"/>
-                      <a:tailEnd type="none" w="med" len="med"/>
-                    </a:lnB>
-                    <a:lnTlToBr w="12700" cmpd="sng">
-                      <a:noFill/>
-                      <a:prstDash val="solid"/>
-                    </a:lnTlToBr>
-                    <a:lnBlToTr w="12700" cmpd="sng">
-                      <a:noFill/>
-                      <a:prstDash val="solid"/>
-                    </a:lnBlToTr>
-                    <a:solidFill>
-                      <a:schemeClr val="accent5">
-                        <a:lumMod val="60000"/>
-                        <a:lumOff val="40000"/>
-                      </a:schemeClr>
-                    </a:solidFill>
-                  </a:tcPr>
-                </a:tc>
-                <a:tc>
-                  <a:txBody>
-                    <a:bodyPr/>
-                    <a:lstStyle/>
-                    <a:p>
-                      <a:r>
-                        <a:rPr lang="en-US" altLang="zh-CN" sz="900" b="0" i="0" dirty="0">
-                          <a:latin typeface="Arial" panose="020B0604020202090204" pitchFamily="34" charset="0"/>
-                          <a:ea typeface="宋体" panose="02010600030101010101" pitchFamily="2" charset="-122"/>
-                          <a:cs typeface="Arial" panose="020B0604020202090204" pitchFamily="34" charset="0"/>
-                        </a:rPr>
-                        <a:t>95</a:t>
-                      </a:r>
-                      <a:endParaRPr lang="en-US" altLang="zh-CN" sz="900" b="0" i="0" dirty="0">
-                        <a:latin typeface="Arial" panose="020B0604020202090204" pitchFamily="34" charset="0"/>
-                        <a:ea typeface="宋体" panose="02010600030101010101" pitchFamily="2" charset="-122"/>
-                        <a:cs typeface="Arial" panose="020B0604020202090204" pitchFamily="34" charset="0"/>
-                      </a:endParaRPr>
-                    </a:p>
-                  </a:txBody>
-                  <a:tcPr>
-                    <a:lnL w="6350" cap="flat" cmpd="sng" algn="ctr">
-                      <a:solidFill>
-                        <a:schemeClr val="tx1"/>
-                      </a:solidFill>
-                      <a:prstDash val="solid"/>
-                      <a:round/>
-                      <a:headEnd type="none" w="med" len="med"/>
-                      <a:tailEnd type="none" w="med" len="med"/>
-                    </a:lnL>
-                    <a:lnR w="6350" cap="flat" cmpd="sng" algn="ctr">
-                      <a:solidFill>
-                        <a:schemeClr val="tx1"/>
-                      </a:solidFill>
-                      <a:prstDash val="solid"/>
-                      <a:round/>
-                      <a:headEnd type="none" w="med" len="med"/>
-                      <a:tailEnd type="none" w="med" len="med"/>
-                    </a:lnR>
-                    <a:lnT w="6350" cap="flat" cmpd="sng" algn="ctr">
-                      <a:solidFill>
-                        <a:schemeClr val="tx1"/>
-                      </a:solidFill>
-                      <a:prstDash val="solid"/>
-                      <a:round/>
-                      <a:headEnd type="none" w="med" len="med"/>
-                      <a:tailEnd type="none" w="med" len="med"/>
-                    </a:lnT>
-                    <a:lnB w="6350" cap="flat" cmpd="sng" algn="ctr">
-                      <a:solidFill>
-                        <a:schemeClr val="tx1"/>
-                      </a:solidFill>
-                      <a:prstDash val="solid"/>
-                      <a:round/>
-                      <a:headEnd type="none" w="med" len="med"/>
-                      <a:tailEnd type="none" w="med" len="med"/>
-                    </a:lnB>
-                    <a:lnTlToBr w="12700" cmpd="sng">
-                      <a:noFill/>
-                      <a:prstDash val="solid"/>
-                    </a:lnTlToBr>
-                    <a:lnBlToTr w="12700" cmpd="sng">
-                      <a:noFill/>
-                      <a:prstDash val="solid"/>
-                    </a:lnBlToTr>
-                  </a:tcPr>
-                </a:tc>
-              </a:tr>
-              <a:tr h="531936">
-                <a:tc>
-                  <a:txBody>
-                    <a:bodyPr/>
-                    <a:lstStyle/>
-                    <a:p>
-                      <a:r>
-                        <a:rPr lang="en-US" altLang="zh-CN" sz="900" b="0" i="0" dirty="0">
-                          <a:latin typeface="Arial" panose="020B0604020202090204" pitchFamily="34" charset="0"/>
-                          <a:ea typeface="宋体" panose="02010600030101010101" pitchFamily="2" charset="-122"/>
-                          <a:cs typeface="Arial" panose="020B0604020202090204" pitchFamily="34" charset="0"/>
-                        </a:rPr>
-                        <a:t>Description</a:t>
-                      </a:r>
-                      <a:endParaRPr lang="zh-CN" altLang="en-US" sz="900" b="0" i="0" dirty="0">
-                        <a:latin typeface="Arial" panose="020B0604020202090204" pitchFamily="34" charset="0"/>
-                        <a:ea typeface="宋体" panose="02010600030101010101" pitchFamily="2" charset="-122"/>
-                        <a:cs typeface="Arial" panose="020B0604020202090204" pitchFamily="34" charset="0"/>
-                      </a:endParaRPr>
-                    </a:p>
-                  </a:txBody>
-                  <a:tcPr>
-                    <a:lnL w="6350" cap="flat" cmpd="sng" algn="ctr">
-                      <a:solidFill>
-                        <a:schemeClr val="tx1"/>
-                      </a:solidFill>
-                      <a:prstDash val="solid"/>
-                      <a:round/>
-                      <a:headEnd type="none" w="med" len="med"/>
-                      <a:tailEnd type="none" w="med" len="med"/>
-                    </a:lnL>
-                    <a:lnR w="6350" cap="flat" cmpd="sng" algn="ctr">
-                      <a:solidFill>
-                        <a:schemeClr val="tx1"/>
-                      </a:solidFill>
-                      <a:prstDash val="solid"/>
-                      <a:round/>
-                      <a:headEnd type="none" w="med" len="med"/>
-                      <a:tailEnd type="none" w="med" len="med"/>
-                    </a:lnR>
-                    <a:lnT w="6350" cap="flat" cmpd="sng" algn="ctr">
-                      <a:solidFill>
-                        <a:schemeClr val="tx1"/>
-                      </a:solidFill>
-                      <a:prstDash val="solid"/>
-                      <a:round/>
-                      <a:headEnd type="none" w="med" len="med"/>
-                      <a:tailEnd type="none" w="med" len="med"/>
-                    </a:lnT>
-                    <a:lnB w="6350" cap="flat" cmpd="sng" algn="ctr">
-                      <a:solidFill>
-                        <a:schemeClr val="tx1"/>
-                      </a:solidFill>
-                      <a:prstDash val="solid"/>
-                      <a:round/>
-                      <a:headEnd type="none" w="med" len="med"/>
-                      <a:tailEnd type="none" w="med" len="med"/>
-                    </a:lnB>
-                    <a:lnTlToBr w="12700" cmpd="sng">
-                      <a:noFill/>
-                      <a:prstDash val="solid"/>
-                    </a:lnTlToBr>
-                    <a:lnBlToTr w="12700" cmpd="sng">
-                      <a:noFill/>
-                      <a:prstDash val="solid"/>
-                    </a:lnBlToTr>
-                    <a:solidFill>
-                      <a:schemeClr val="accent5">
-                        <a:lumMod val="60000"/>
-                        <a:lumOff val="40000"/>
-                      </a:schemeClr>
-                    </a:solidFill>
-                  </a:tcPr>
-                </a:tc>
-                <a:tc>
-                  <a:txBody>
-                    <a:bodyPr/>
-                    <a:lstStyle/>
-                    <a:p>
-                      <a:r>
-                        <a:rPr lang="en-US" altLang="zh-CN" sz="900" b="0" i="0" dirty="0">
-                          <a:latin typeface="Arial" panose="020B0604020202090204" pitchFamily="34" charset="0"/>
-                          <a:ea typeface="宋体" panose="02010600030101010101" pitchFamily="2" charset="-122"/>
-                          <a:cs typeface="Arial" panose="020B0604020202090204" pitchFamily="34" charset="0"/>
-                        </a:rPr>
-                        <a:t>HSG inner length</a:t>
-                      </a:r>
-                      <a:endParaRPr lang="en-US" altLang="zh-CN" sz="900" b="0" i="0" dirty="0">
-                        <a:latin typeface="Arial" panose="020B0604020202090204" pitchFamily="34" charset="0"/>
-                        <a:ea typeface="宋体" panose="02010600030101010101" pitchFamily="2" charset="-122"/>
-                        <a:cs typeface="Arial" panose="020B0604020202090204" pitchFamily="34" charset="0"/>
-                      </a:endParaRPr>
-                    </a:p>
-                  </a:txBody>
-                  <a:tcPr>
-                    <a:lnL w="6350" cap="flat" cmpd="sng" algn="ctr">
-                      <a:solidFill>
-                        <a:schemeClr val="tx1"/>
-                      </a:solidFill>
-                      <a:prstDash val="solid"/>
-                      <a:round/>
-                      <a:headEnd type="none" w="med" len="med"/>
-                      <a:tailEnd type="none" w="med" len="med"/>
-                    </a:lnL>
-                    <a:lnR w="6350" cap="flat" cmpd="sng" algn="ctr">
-                      <a:solidFill>
-                        <a:schemeClr val="tx1"/>
-                      </a:solidFill>
-                      <a:prstDash val="solid"/>
-                      <a:round/>
-                      <a:headEnd type="none" w="med" len="med"/>
-                      <a:tailEnd type="none" w="med" len="med"/>
-                    </a:lnR>
-                    <a:lnT w="6350" cap="flat" cmpd="sng" algn="ctr">
-                      <a:solidFill>
-                        <a:schemeClr val="tx1"/>
-                      </a:solidFill>
-                      <a:prstDash val="solid"/>
-                      <a:round/>
-                      <a:headEnd type="none" w="med" len="med"/>
-                      <a:tailEnd type="none" w="med" len="med"/>
-                    </a:lnT>
-                    <a:lnB w="6350" cap="flat" cmpd="sng" algn="ctr">
-                      <a:solidFill>
-                        <a:schemeClr val="tx1"/>
-                      </a:solidFill>
-                      <a:prstDash val="solid"/>
-                      <a:round/>
-                      <a:headEnd type="none" w="med" len="med"/>
-                      <a:tailEnd type="none" w="med" len="med"/>
-                    </a:lnB>
-                    <a:lnTlToBr w="12700" cmpd="sng">
-                      <a:noFill/>
-                      <a:prstDash val="solid"/>
-                    </a:lnTlToBr>
-                    <a:lnBlToTr w="12700" cmpd="sng">
-                      <a:noFill/>
-                      <a:prstDash val="solid"/>
-                    </a:lnBlToTr>
-                  </a:tcPr>
-                </a:tc>
-              </a:tr>
-              <a:tr h="320791">
-                <a:tc>
-                  <a:txBody>
-                    <a:bodyPr/>
-                    <a:lstStyle/>
-                    <a:p>
-                      <a:r>
-                        <a:rPr lang="en-US" altLang="zh-CN" sz="900" b="0" i="0" dirty="0">
-                          <a:latin typeface="Arial" panose="020B0604020202090204" pitchFamily="34" charset="0"/>
-                          <a:ea typeface="宋体" panose="02010600030101010101" pitchFamily="2" charset="-122"/>
-                          <a:cs typeface="Arial" panose="020B0604020202090204" pitchFamily="34" charset="0"/>
-                        </a:rPr>
-                        <a:t>Nominal</a:t>
-                      </a:r>
-                      <a:endParaRPr lang="zh-CN" altLang="en-US" sz="900" b="0" i="0" dirty="0">
-                        <a:latin typeface="Arial" panose="020B0604020202090204" pitchFamily="34" charset="0"/>
-                        <a:ea typeface="宋体" panose="02010600030101010101" pitchFamily="2" charset="-122"/>
-                        <a:cs typeface="Arial" panose="020B0604020202090204" pitchFamily="34" charset="0"/>
-                      </a:endParaRPr>
-                    </a:p>
-                  </a:txBody>
-                  <a:tcPr>
-                    <a:lnL w="6350" cap="flat" cmpd="sng" algn="ctr">
-                      <a:solidFill>
-                        <a:schemeClr val="tx1"/>
-                      </a:solidFill>
-                      <a:prstDash val="solid"/>
-                      <a:round/>
-                      <a:headEnd type="none" w="med" len="med"/>
-                      <a:tailEnd type="none" w="med" len="med"/>
-                    </a:lnL>
-                    <a:lnR w="6350" cap="flat" cmpd="sng" algn="ctr">
-                      <a:solidFill>
-                        <a:schemeClr val="tx1"/>
-                      </a:solidFill>
-                      <a:prstDash val="solid"/>
-                      <a:round/>
-                      <a:headEnd type="none" w="med" len="med"/>
-                      <a:tailEnd type="none" w="med" len="med"/>
-                    </a:lnR>
-                    <a:lnT w="6350" cap="flat" cmpd="sng" algn="ctr">
-                      <a:solidFill>
-                        <a:schemeClr val="tx1"/>
-                      </a:solidFill>
-                      <a:prstDash val="solid"/>
-                      <a:round/>
-                      <a:headEnd type="none" w="med" len="med"/>
-                      <a:tailEnd type="none" w="med" len="med"/>
-                    </a:lnT>
-                    <a:lnB w="6350" cap="flat" cmpd="sng" algn="ctr">
-                      <a:solidFill>
-                        <a:schemeClr val="tx1"/>
-                      </a:solidFill>
-                      <a:prstDash val="solid"/>
-                      <a:round/>
-                      <a:headEnd type="none" w="med" len="med"/>
-                      <a:tailEnd type="none" w="med" len="med"/>
-                    </a:lnB>
-                    <a:lnTlToBr w="12700" cmpd="sng">
-                      <a:noFill/>
-                      <a:prstDash val="solid"/>
-                    </a:lnTlToBr>
-                    <a:lnBlToTr w="12700" cmpd="sng">
-                      <a:noFill/>
-                      <a:prstDash val="solid"/>
-                    </a:lnBlToTr>
-                    <a:solidFill>
-                      <a:schemeClr val="accent5">
-                        <a:lumMod val="60000"/>
-                        <a:lumOff val="40000"/>
-                      </a:schemeClr>
-                    </a:solidFill>
-                  </a:tcPr>
-                </a:tc>
-                <a:tc>
-                  <a:txBody>
-                    <a:bodyPr/>
-                    <a:lstStyle/>
-                    <a:p>
-                      <a:r>
-                        <a:rPr lang="en-US" altLang="zh-CN" sz="900" b="0" i="0" dirty="0">
-                          <a:latin typeface="Arial" panose="020B0604020202090204" pitchFamily="34" charset="0"/>
-                          <a:ea typeface="宋体" panose="02010600030101010101" pitchFamily="2" charset="-122"/>
-                          <a:cs typeface="Arial" panose="020B0604020202090204" pitchFamily="34" charset="0"/>
-                        </a:rPr>
-                        <a:t>245.728</a:t>
-                      </a:r>
-                      <a:endParaRPr lang="zh-CN" altLang="en-US" sz="900" b="0" i="0" dirty="0">
-                        <a:latin typeface="Arial" panose="020B0604020202090204" pitchFamily="34" charset="0"/>
-                        <a:ea typeface="宋体" panose="02010600030101010101" pitchFamily="2" charset="-122"/>
-                        <a:cs typeface="Arial" panose="020B0604020202090204" pitchFamily="34" charset="0"/>
-                      </a:endParaRPr>
-                    </a:p>
-                  </a:txBody>
-                  <a:tcPr>
-                    <a:lnL w="6350" cap="flat" cmpd="sng" algn="ctr">
-                      <a:solidFill>
-                        <a:schemeClr val="tx1"/>
-                      </a:solidFill>
-                      <a:prstDash val="solid"/>
-                      <a:round/>
-                      <a:headEnd type="none" w="med" len="med"/>
-                      <a:tailEnd type="none" w="med" len="med"/>
-                    </a:lnL>
-                    <a:lnR w="6350" cap="flat" cmpd="sng" algn="ctr">
-                      <a:solidFill>
-                        <a:schemeClr val="tx1"/>
-                      </a:solidFill>
-                      <a:prstDash val="solid"/>
-                      <a:round/>
-                      <a:headEnd type="none" w="med" len="med"/>
-                      <a:tailEnd type="none" w="med" len="med"/>
-                    </a:lnR>
-                    <a:lnT w="6350" cap="flat" cmpd="sng" algn="ctr">
-                      <a:solidFill>
-                        <a:schemeClr val="tx1"/>
-                      </a:solidFill>
-                      <a:prstDash val="solid"/>
-                      <a:round/>
-                      <a:headEnd type="none" w="med" len="med"/>
-                      <a:tailEnd type="none" w="med" len="med"/>
-                    </a:lnT>
-                    <a:lnB w="6350" cap="flat" cmpd="sng" algn="ctr">
-                      <a:solidFill>
-                        <a:schemeClr val="tx1"/>
-                      </a:solidFill>
-                      <a:prstDash val="solid"/>
-                      <a:round/>
-                      <a:headEnd type="none" w="med" len="med"/>
-                      <a:tailEnd type="none" w="med" len="med"/>
-                    </a:lnB>
-                    <a:lnTlToBr w="12700" cmpd="sng">
-                      <a:noFill/>
-                      <a:prstDash val="solid"/>
-                    </a:lnTlToBr>
-                    <a:lnBlToTr w="12700" cmpd="sng">
-                      <a:noFill/>
-                      <a:prstDash val="solid"/>
-                    </a:lnBlToTr>
-                  </a:tcPr>
-                </a:tc>
-              </a:tr>
-              <a:tr h="320791">
-                <a:tc>
-                  <a:txBody>
-                    <a:bodyPr/>
-                    <a:lstStyle/>
-                    <a:p>
-                      <a:r>
-                        <a:rPr lang="en-US" altLang="zh-CN" sz="900" b="0" i="0" dirty="0">
-                          <a:latin typeface="Arial" panose="020B0604020202090204" pitchFamily="34" charset="0"/>
-                          <a:ea typeface="宋体" panose="02010600030101010101" pitchFamily="2" charset="-122"/>
-                          <a:cs typeface="Arial" panose="020B0604020202090204" pitchFamily="34" charset="0"/>
-                        </a:rPr>
-                        <a:t>Tol+</a:t>
-                      </a:r>
-                      <a:endParaRPr lang="zh-CN" altLang="en-US" sz="900" b="0" i="0" dirty="0">
-                        <a:latin typeface="Arial" panose="020B0604020202090204" pitchFamily="34" charset="0"/>
-                        <a:ea typeface="宋体" panose="02010600030101010101" pitchFamily="2" charset="-122"/>
-                        <a:cs typeface="Arial" panose="020B0604020202090204" pitchFamily="34" charset="0"/>
-                      </a:endParaRPr>
-                    </a:p>
-                  </a:txBody>
-                  <a:tcPr>
-                    <a:lnL w="6350" cap="flat" cmpd="sng" algn="ctr">
-                      <a:solidFill>
-                        <a:schemeClr val="tx1"/>
-                      </a:solidFill>
-                      <a:prstDash val="solid"/>
-                      <a:round/>
-                      <a:headEnd type="none" w="med" len="med"/>
-                      <a:tailEnd type="none" w="med" len="med"/>
-                    </a:lnL>
-                    <a:lnR w="6350" cap="flat" cmpd="sng" algn="ctr">
-                      <a:solidFill>
-                        <a:schemeClr val="tx1"/>
-                      </a:solidFill>
-                      <a:prstDash val="solid"/>
-                      <a:round/>
-                      <a:headEnd type="none" w="med" len="med"/>
-                      <a:tailEnd type="none" w="med" len="med"/>
-                    </a:lnR>
-                    <a:lnT w="6350" cap="flat" cmpd="sng" algn="ctr">
-                      <a:solidFill>
-                        <a:schemeClr val="tx1"/>
-                      </a:solidFill>
-                      <a:prstDash val="solid"/>
-                      <a:round/>
-                      <a:headEnd type="none" w="med" len="med"/>
-                      <a:tailEnd type="none" w="med" len="med"/>
-                    </a:lnT>
-                    <a:lnB w="6350" cap="flat" cmpd="sng" algn="ctr">
-                      <a:solidFill>
-                        <a:schemeClr val="tx1"/>
-                      </a:solidFill>
-                      <a:prstDash val="solid"/>
-                      <a:round/>
-                      <a:headEnd type="none" w="med" len="med"/>
-                      <a:tailEnd type="none" w="med" len="med"/>
-                    </a:lnB>
-                    <a:lnTlToBr w="12700" cmpd="sng">
-                      <a:noFill/>
-                      <a:prstDash val="solid"/>
-                    </a:lnTlToBr>
-                    <a:lnBlToTr w="12700" cmpd="sng">
-                      <a:noFill/>
-                      <a:prstDash val="solid"/>
-                    </a:lnBlToTr>
-                    <a:solidFill>
-                      <a:schemeClr val="accent5">
-                        <a:lumMod val="60000"/>
-                        <a:lumOff val="40000"/>
-                      </a:schemeClr>
-                    </a:solidFill>
-                  </a:tcPr>
-                </a:tc>
-                <a:tc>
-                  <a:txBody>
-                    <a:bodyPr/>
-                    <a:lstStyle/>
-                    <a:p>
-                      <a:r>
-                        <a:rPr lang="en-US" altLang="zh-CN" sz="900" b="0" i="0" dirty="0">
-                          <a:latin typeface="Arial" panose="020B0604020202090204" pitchFamily="34" charset="0"/>
-                          <a:ea typeface="宋体" panose="02010600030101010101" pitchFamily="2" charset="-122"/>
-                          <a:cs typeface="Arial" panose="020B0604020202090204" pitchFamily="34" charset="0"/>
-                        </a:rPr>
-                        <a:t>+0.15</a:t>
-                      </a:r>
-                      <a:endParaRPr lang="zh-CN" altLang="en-US" sz="900" b="0" i="0" dirty="0">
-                        <a:latin typeface="Arial" panose="020B0604020202090204" pitchFamily="34" charset="0"/>
-                        <a:ea typeface="宋体" panose="02010600030101010101" pitchFamily="2" charset="-122"/>
-                        <a:cs typeface="Arial" panose="020B0604020202090204" pitchFamily="34" charset="0"/>
-                      </a:endParaRPr>
-                    </a:p>
-                  </a:txBody>
-                  <a:tcPr>
-                    <a:lnL w="6350" cap="flat" cmpd="sng" algn="ctr">
-                      <a:solidFill>
-                        <a:schemeClr val="tx1"/>
-                      </a:solidFill>
-                      <a:prstDash val="solid"/>
-                      <a:round/>
-                      <a:headEnd type="none" w="med" len="med"/>
-                      <a:tailEnd type="none" w="med" len="med"/>
-                    </a:lnL>
-                    <a:lnR w="6350" cap="flat" cmpd="sng" algn="ctr">
-                      <a:solidFill>
-                        <a:schemeClr val="tx1"/>
-                      </a:solidFill>
-                      <a:prstDash val="solid"/>
-                      <a:round/>
-                      <a:headEnd type="none" w="med" len="med"/>
-                      <a:tailEnd type="none" w="med" len="med"/>
-                    </a:lnR>
-                    <a:lnT w="6350" cap="flat" cmpd="sng" algn="ctr">
-                      <a:solidFill>
-                        <a:schemeClr val="tx1"/>
-                      </a:solidFill>
-                      <a:prstDash val="solid"/>
-                      <a:round/>
-                      <a:headEnd type="none" w="med" len="med"/>
-                      <a:tailEnd type="none" w="med" len="med"/>
-                    </a:lnT>
-                    <a:lnB w="6350" cap="flat" cmpd="sng" algn="ctr">
-                      <a:solidFill>
-                        <a:schemeClr val="tx1"/>
-                      </a:solidFill>
-                      <a:prstDash val="solid"/>
-                      <a:round/>
-                      <a:headEnd type="none" w="med" len="med"/>
-                      <a:tailEnd type="none" w="med" len="med"/>
-                    </a:lnB>
-                    <a:lnTlToBr w="12700" cmpd="sng">
-                      <a:noFill/>
-                      <a:prstDash val="solid"/>
-                    </a:lnTlToBr>
-                    <a:lnBlToTr w="12700" cmpd="sng">
-                      <a:noFill/>
-                      <a:prstDash val="solid"/>
-                    </a:lnBlToTr>
-                  </a:tcPr>
-                </a:tc>
-              </a:tr>
-              <a:tr h="320791">
-                <a:tc>
-                  <a:txBody>
-                    <a:bodyPr/>
-                    <a:lstStyle/>
-                    <a:p>
-                      <a:r>
-                        <a:rPr lang="en-US" altLang="zh-CN" sz="900" b="0" i="0" dirty="0">
-                          <a:latin typeface="Arial" panose="020B0604020202090204" pitchFamily="34" charset="0"/>
-                          <a:ea typeface="宋体" panose="02010600030101010101" pitchFamily="2" charset="-122"/>
-                          <a:cs typeface="Arial" panose="020B0604020202090204" pitchFamily="34" charset="0"/>
-                        </a:rPr>
-                        <a:t>Tol-</a:t>
-                      </a:r>
-                      <a:endParaRPr lang="zh-CN" altLang="en-US" sz="900" b="0" i="0" dirty="0">
-                        <a:latin typeface="Arial" panose="020B0604020202090204" pitchFamily="34" charset="0"/>
-                        <a:ea typeface="宋体" panose="02010600030101010101" pitchFamily="2" charset="-122"/>
-                        <a:cs typeface="Arial" panose="020B0604020202090204" pitchFamily="34" charset="0"/>
-                      </a:endParaRPr>
-                    </a:p>
-                  </a:txBody>
-                  <a:tcPr>
-                    <a:lnL w="6350" cap="flat" cmpd="sng" algn="ctr">
-                      <a:solidFill>
-                        <a:schemeClr val="tx1"/>
-                      </a:solidFill>
-                      <a:prstDash val="solid"/>
-                      <a:round/>
-                      <a:headEnd type="none" w="med" len="med"/>
-                      <a:tailEnd type="none" w="med" len="med"/>
-                    </a:lnL>
-                    <a:lnR w="6350" cap="flat" cmpd="sng" algn="ctr">
-                      <a:solidFill>
-                        <a:schemeClr val="tx1"/>
-                      </a:solidFill>
-                      <a:prstDash val="solid"/>
-                      <a:round/>
-                      <a:headEnd type="none" w="med" len="med"/>
-                      <a:tailEnd type="none" w="med" len="med"/>
-                    </a:lnR>
-                    <a:lnT w="6350" cap="flat" cmpd="sng" algn="ctr">
-                      <a:solidFill>
-                        <a:schemeClr val="tx1"/>
-                      </a:solidFill>
-                      <a:prstDash val="solid"/>
-                      <a:round/>
-                      <a:headEnd type="none" w="med" len="med"/>
-                      <a:tailEnd type="none" w="med" len="med"/>
-                    </a:lnT>
-                    <a:lnB w="6350" cap="flat" cmpd="sng" algn="ctr">
-                      <a:solidFill>
-                        <a:schemeClr val="tx1"/>
-                      </a:solidFill>
-                      <a:prstDash val="solid"/>
-                      <a:round/>
-                      <a:headEnd type="none" w="med" len="med"/>
-                      <a:tailEnd type="none" w="med" len="med"/>
-                    </a:lnB>
-                    <a:lnTlToBr w="12700" cmpd="sng">
-                      <a:noFill/>
-                      <a:prstDash val="solid"/>
-                    </a:lnTlToBr>
-                    <a:lnBlToTr w="12700" cmpd="sng">
-                      <a:noFill/>
-                      <a:prstDash val="solid"/>
-                    </a:lnBlToTr>
-                    <a:solidFill>
-                      <a:schemeClr val="accent5">
-                        <a:lumMod val="60000"/>
-                        <a:lumOff val="40000"/>
-                      </a:schemeClr>
-                    </a:solidFill>
-                  </a:tcPr>
-                </a:tc>
-                <a:tc>
-                  <a:txBody>
-                    <a:bodyPr/>
-                    <a:lstStyle/>
-                    <a:p>
-                      <a:r>
-                        <a:rPr lang="en-US" altLang="zh-CN" sz="900" b="0" i="0" dirty="0">
-                          <a:latin typeface="Arial" panose="020B0604020202090204" pitchFamily="34" charset="0"/>
-                          <a:ea typeface="宋体" panose="02010600030101010101" pitchFamily="2" charset="-122"/>
-                          <a:cs typeface="Arial" panose="020B0604020202090204" pitchFamily="34" charset="0"/>
-                        </a:rPr>
-                        <a:t>-0.05</a:t>
-                      </a:r>
-                      <a:endParaRPr lang="en-US" altLang="zh-CN" sz="900" b="0" i="0" dirty="0">
-                        <a:latin typeface="Arial" panose="020B0604020202090204" pitchFamily="34" charset="0"/>
-                        <a:ea typeface="宋体" panose="02010600030101010101" pitchFamily="2" charset="-122"/>
-                        <a:cs typeface="Arial" panose="020B0604020202090204" pitchFamily="34" charset="0"/>
-                      </a:endParaRPr>
-                    </a:p>
-                  </a:txBody>
-                  <a:tcPr>
-                    <a:lnL w="6350" cap="flat" cmpd="sng" algn="ctr">
-                      <a:solidFill>
-                        <a:schemeClr val="tx1"/>
-                      </a:solidFill>
-                      <a:prstDash val="solid"/>
-                      <a:round/>
-                      <a:headEnd type="none" w="med" len="med"/>
-                      <a:tailEnd type="none" w="med" len="med"/>
-                    </a:lnL>
-                    <a:lnR w="6350" cap="flat" cmpd="sng" algn="ctr">
-                      <a:solidFill>
-                        <a:schemeClr val="tx1"/>
-                      </a:solidFill>
-                      <a:prstDash val="solid"/>
-                      <a:round/>
-                      <a:headEnd type="none" w="med" len="med"/>
-                      <a:tailEnd type="none" w="med" len="med"/>
-                    </a:lnR>
-                    <a:lnT w="6350" cap="flat" cmpd="sng" algn="ctr">
-                      <a:solidFill>
-                        <a:schemeClr val="tx1"/>
-                      </a:solidFill>
-                      <a:prstDash val="solid"/>
-                      <a:round/>
-                      <a:headEnd type="none" w="med" len="med"/>
-                      <a:tailEnd type="none" w="med" len="med"/>
-                    </a:lnT>
-                    <a:lnB w="6350" cap="flat" cmpd="sng" algn="ctr">
-                      <a:solidFill>
-                        <a:schemeClr val="tx1"/>
-                      </a:solidFill>
-                      <a:prstDash val="solid"/>
-                      <a:round/>
-                      <a:headEnd type="none" w="med" len="med"/>
-                      <a:tailEnd type="none" w="med" len="med"/>
-                    </a:lnB>
-                    <a:lnTlToBr w="12700" cmpd="sng">
-                      <a:noFill/>
-                      <a:prstDash val="solid"/>
-                    </a:lnTlToBr>
-                    <a:lnBlToTr w="12700" cmpd="sng">
-                      <a:noFill/>
-                      <a:prstDash val="solid"/>
-                    </a:lnBlToTr>
-                  </a:tcPr>
-                </a:tc>
-              </a:tr>
-              <a:tr h="320791">
-                <a:tc>
-                  <a:txBody>
-                    <a:bodyPr/>
-                    <a:lstStyle/>
-                    <a:p>
-                      <a:r>
-                        <a:rPr lang="en-US" altLang="zh-CN" sz="900" b="0" i="0" dirty="0">
-                          <a:latin typeface="Arial" panose="020B0604020202090204" pitchFamily="34" charset="0"/>
-                          <a:ea typeface="宋体" panose="02010600030101010101" pitchFamily="2" charset="-122"/>
-                          <a:cs typeface="Arial" panose="020B0604020202090204" pitchFamily="34" charset="0"/>
-                        </a:rPr>
-                        <a:t>Equipment</a:t>
-                      </a:r>
-                      <a:endParaRPr lang="zh-CN" altLang="en-US" sz="900" b="0" i="0" dirty="0">
-                        <a:latin typeface="Arial" panose="020B0604020202090204" pitchFamily="34" charset="0"/>
-                        <a:ea typeface="宋体" panose="02010600030101010101" pitchFamily="2" charset="-122"/>
-                        <a:cs typeface="Arial" panose="020B0604020202090204" pitchFamily="34" charset="0"/>
-                      </a:endParaRPr>
-                    </a:p>
-                  </a:txBody>
-                  <a:tcPr>
-                    <a:lnL w="6350" cap="flat" cmpd="sng" algn="ctr">
-                      <a:solidFill>
-                        <a:schemeClr val="tx1"/>
-                      </a:solidFill>
-                      <a:prstDash val="solid"/>
-                      <a:round/>
-                      <a:headEnd type="none" w="med" len="med"/>
-                      <a:tailEnd type="none" w="med" len="med"/>
-                    </a:lnL>
-                    <a:lnR w="6350" cap="flat" cmpd="sng" algn="ctr">
-                      <a:solidFill>
-                        <a:schemeClr val="tx1"/>
-                      </a:solidFill>
-                      <a:prstDash val="solid"/>
-                      <a:round/>
-                      <a:headEnd type="none" w="med" len="med"/>
-                      <a:tailEnd type="none" w="med" len="med"/>
-                    </a:lnR>
-                    <a:lnT w="6350" cap="flat" cmpd="sng" algn="ctr">
-                      <a:solidFill>
-                        <a:schemeClr val="tx1"/>
-                      </a:solidFill>
-                      <a:prstDash val="solid"/>
-                      <a:round/>
-                      <a:headEnd type="none" w="med" len="med"/>
-                      <a:tailEnd type="none" w="med" len="med"/>
-                    </a:lnT>
-                    <a:lnB w="6350" cap="flat" cmpd="sng" algn="ctr">
-                      <a:solidFill>
-                        <a:schemeClr val="tx1"/>
-                      </a:solidFill>
-                      <a:prstDash val="solid"/>
-                      <a:round/>
-                      <a:headEnd type="none" w="med" len="med"/>
-                      <a:tailEnd type="none" w="med" len="med"/>
-                    </a:lnB>
-                    <a:lnTlToBr w="12700" cmpd="sng">
-                      <a:noFill/>
-                      <a:prstDash val="solid"/>
-                    </a:lnTlToBr>
-                    <a:lnBlToTr w="12700" cmpd="sng">
-                      <a:noFill/>
-                      <a:prstDash val="solid"/>
-                    </a:lnBlToTr>
-                    <a:solidFill>
-                      <a:schemeClr val="accent5">
-                        <a:lumMod val="60000"/>
-                        <a:lumOff val="40000"/>
-                      </a:schemeClr>
-                    </a:solidFill>
-                  </a:tcPr>
-                </a:tc>
-                <a:tc>
-                  <a:txBody>
-                    <a:bodyPr/>
-                    <a:lstStyle/>
-                    <a:p>
-                      <a:r>
-                        <a:rPr lang="en-US" altLang="zh-CN" sz="900" b="0" i="0" dirty="0">
-                          <a:latin typeface="Arial" panose="020B0604020202090204" pitchFamily="34" charset="0"/>
-                          <a:ea typeface="宋体" panose="02010600030101010101" pitchFamily="2" charset="-122"/>
-                          <a:cs typeface="Arial" panose="020B0604020202090204" pitchFamily="34" charset="0"/>
-                        </a:rPr>
-                        <a:t>CMM</a:t>
-                      </a:r>
-                      <a:endParaRPr lang="zh-CN" altLang="en-US" sz="900" b="0" i="0" dirty="0">
-                        <a:latin typeface="Arial" panose="020B0604020202090204" pitchFamily="34" charset="0"/>
-                        <a:ea typeface="宋体" panose="02010600030101010101" pitchFamily="2" charset="-122"/>
-                        <a:cs typeface="Arial" panose="020B0604020202090204" pitchFamily="34" charset="0"/>
-                      </a:endParaRPr>
-                    </a:p>
-                  </a:txBody>
-                  <a:tcPr>
-                    <a:lnL w="6350" cap="flat" cmpd="sng" algn="ctr">
-                      <a:solidFill>
-                        <a:schemeClr val="tx1"/>
-                      </a:solidFill>
-                      <a:prstDash val="solid"/>
-                      <a:round/>
-                      <a:headEnd type="none" w="med" len="med"/>
-                      <a:tailEnd type="none" w="med" len="med"/>
-                    </a:lnL>
-                    <a:lnR w="6350" cap="flat" cmpd="sng" algn="ctr">
-                      <a:solidFill>
-                        <a:schemeClr val="tx1"/>
-                      </a:solidFill>
-                      <a:prstDash val="solid"/>
-                      <a:round/>
-                      <a:headEnd type="none" w="med" len="med"/>
-                      <a:tailEnd type="none" w="med" len="med"/>
-                    </a:lnR>
-                    <a:lnT w="6350" cap="flat" cmpd="sng" algn="ctr">
-                      <a:solidFill>
-                        <a:schemeClr val="tx1"/>
-                      </a:solidFill>
-                      <a:prstDash val="solid"/>
-                      <a:round/>
-                      <a:headEnd type="none" w="med" len="med"/>
-                      <a:tailEnd type="none" w="med" len="med"/>
-                    </a:lnT>
-                    <a:lnB w="6350" cap="flat" cmpd="sng" algn="ctr">
-                      <a:solidFill>
-                        <a:schemeClr val="tx1"/>
-                      </a:solidFill>
-                      <a:prstDash val="solid"/>
-                      <a:round/>
-                      <a:headEnd type="none" w="med" len="med"/>
-                      <a:tailEnd type="none" w="med" len="med"/>
-                    </a:lnB>
-                    <a:lnTlToBr w="12700" cmpd="sng">
-                      <a:noFill/>
-                      <a:prstDash val="solid"/>
-                    </a:lnTlToBr>
-                    <a:lnBlToTr w="12700" cmpd="sng">
-                      <a:noFill/>
-                      <a:prstDash val="solid"/>
-                    </a:lnBlToTr>
-                  </a:tcPr>
-                </a:tc>
-              </a:tr>
-              <a:tr h="365129">
-                <a:tc>
-                  <a:txBody>
-                    <a:bodyPr/>
-                    <a:lstStyle/>
-                    <a:p>
-                      <a:r>
-                        <a:rPr lang="en-US" altLang="zh-CN" sz="900" b="0" i="0" dirty="0">
-                          <a:latin typeface="Arial" panose="020B0604020202090204" pitchFamily="34" charset="0"/>
-                          <a:ea typeface="宋体" panose="02010600030101010101" pitchFamily="2" charset="-122"/>
-                          <a:cs typeface="Arial" panose="020B0604020202090204" pitchFamily="34" charset="0"/>
-                        </a:rPr>
-                        <a:t>Fixture Positioning</a:t>
-                      </a:r>
-                      <a:endParaRPr lang="zh-CN" altLang="en-US" sz="900" b="0" i="0" dirty="0">
-                        <a:latin typeface="Arial" panose="020B0604020202090204" pitchFamily="34" charset="0"/>
-                        <a:ea typeface="宋体" panose="02010600030101010101" pitchFamily="2" charset="-122"/>
-                        <a:cs typeface="Arial" panose="020B0604020202090204" pitchFamily="34" charset="0"/>
-                      </a:endParaRPr>
-                    </a:p>
-                  </a:txBody>
-                  <a:tcPr>
-                    <a:lnL w="6350" cap="flat" cmpd="sng" algn="ctr">
-                      <a:solidFill>
-                        <a:schemeClr val="tx1"/>
-                      </a:solidFill>
-                      <a:prstDash val="solid"/>
-                      <a:round/>
-                      <a:headEnd type="none" w="med" len="med"/>
-                      <a:tailEnd type="none" w="med" len="med"/>
-                    </a:lnL>
-                    <a:lnR w="6350" cap="flat" cmpd="sng" algn="ctr">
-                      <a:solidFill>
-                        <a:schemeClr val="tx1"/>
-                      </a:solidFill>
-                      <a:prstDash val="solid"/>
-                      <a:round/>
-                      <a:headEnd type="none" w="med" len="med"/>
-                      <a:tailEnd type="none" w="med" len="med"/>
-                    </a:lnR>
-                    <a:lnT w="6350" cap="flat" cmpd="sng" algn="ctr">
-                      <a:solidFill>
-                        <a:schemeClr val="tx1"/>
-                      </a:solidFill>
-                      <a:prstDash val="solid"/>
-                      <a:round/>
-                      <a:headEnd type="none" w="med" len="med"/>
-                      <a:tailEnd type="none" w="med" len="med"/>
-                    </a:lnT>
-                    <a:lnB w="6350" cap="flat" cmpd="sng" algn="ctr">
-                      <a:solidFill>
-                        <a:schemeClr val="tx1"/>
-                      </a:solidFill>
-                      <a:prstDash val="solid"/>
-                      <a:round/>
-                      <a:headEnd type="none" w="med" len="med"/>
-                      <a:tailEnd type="none" w="med" len="med"/>
-                    </a:lnB>
-                    <a:lnTlToBr w="12700" cmpd="sng">
-                      <a:noFill/>
-                      <a:prstDash val="solid"/>
-                    </a:lnTlToBr>
-                    <a:lnBlToTr w="12700" cmpd="sng">
-                      <a:noFill/>
-                      <a:prstDash val="solid"/>
-                    </a:lnBlToTr>
-                    <a:solidFill>
-                      <a:schemeClr val="accent5">
-                        <a:lumMod val="60000"/>
-                        <a:lumOff val="40000"/>
-                      </a:schemeClr>
-                    </a:solidFill>
-                  </a:tcPr>
-                </a:tc>
-                <a:tc>
-                  <a:txBody>
-                    <a:bodyPr/>
-                    <a:lstStyle/>
-                    <a:p>
-                      <a:r>
-                        <a:rPr lang="en-US" altLang="zh-CN" sz="900" b="0" i="0" dirty="0">
-                          <a:latin typeface="Arial" panose="020B0604020202090204" pitchFamily="34" charset="0"/>
-                          <a:ea typeface="宋体" panose="02010600030101010101" pitchFamily="2" charset="-122"/>
-                          <a:cs typeface="Arial" panose="020B0604020202090204" pitchFamily="34" charset="0"/>
-                        </a:rPr>
-                        <a:t>Vacuum adsorption</a:t>
-                      </a:r>
-                      <a:endParaRPr lang="zh-CN" altLang="en-US" sz="900" b="0" i="0" dirty="0">
-                        <a:latin typeface="Arial" panose="020B0604020202090204" pitchFamily="34" charset="0"/>
-                        <a:ea typeface="宋体" panose="02010600030101010101" pitchFamily="2" charset="-122"/>
-                        <a:cs typeface="Arial" panose="020B0604020202090204" pitchFamily="34" charset="0"/>
-                      </a:endParaRPr>
-                    </a:p>
-                  </a:txBody>
-                  <a:tcPr>
-                    <a:lnL w="6350" cap="flat" cmpd="sng" algn="ctr">
-                      <a:solidFill>
-                        <a:schemeClr val="tx1"/>
-                      </a:solidFill>
-                      <a:prstDash val="solid"/>
-                      <a:round/>
-                      <a:headEnd type="none" w="med" len="med"/>
-                      <a:tailEnd type="none" w="med" len="med"/>
-                    </a:lnL>
-                    <a:lnR w="6350" cap="flat" cmpd="sng" algn="ctr">
-                      <a:solidFill>
-                        <a:schemeClr val="tx1"/>
-                      </a:solidFill>
-                      <a:prstDash val="solid"/>
-                      <a:round/>
-                      <a:headEnd type="none" w="med" len="med"/>
-                      <a:tailEnd type="none" w="med" len="med"/>
-                    </a:lnR>
-                    <a:lnT w="6350" cap="flat" cmpd="sng" algn="ctr">
-                      <a:solidFill>
-                        <a:schemeClr val="tx1"/>
-                      </a:solidFill>
-                      <a:prstDash val="solid"/>
-                      <a:round/>
-                      <a:headEnd type="none" w="med" len="med"/>
-                      <a:tailEnd type="none" w="med" len="med"/>
-                    </a:lnT>
-                    <a:lnB w="6350" cap="flat" cmpd="sng" algn="ctr">
-                      <a:solidFill>
-                        <a:schemeClr val="tx1"/>
-                      </a:solidFill>
-                      <a:prstDash val="solid"/>
-                      <a:round/>
-                      <a:headEnd type="none" w="med" len="med"/>
-                      <a:tailEnd type="none" w="med" len="med"/>
-                    </a:lnB>
-                    <a:lnTlToBr w="12700" cmpd="sng">
-                      <a:noFill/>
-                      <a:prstDash val="solid"/>
-                    </a:lnTlToBr>
-                    <a:lnBlToTr w="12700" cmpd="sng">
-                      <a:noFill/>
-                      <a:prstDash val="solid"/>
-                    </a:lnBlToTr>
-                  </a:tcPr>
-                </a:tc>
-              </a:tr>
-              <a:tr h="365129">
-                <a:tc>
-                  <a:txBody>
-                    <a:bodyPr/>
-                    <a:lstStyle/>
-                    <a:p>
-                      <a:r>
-                        <a:rPr lang="en-US" altLang="zh-CN" sz="900" b="0" i="0" dirty="0">
-                          <a:latin typeface="Arial" panose="020B0604020202090204" pitchFamily="34" charset="0"/>
-                          <a:ea typeface="宋体" panose="02010600030101010101" pitchFamily="2" charset="-122"/>
-                          <a:cs typeface="Arial" panose="020B0604020202090204" pitchFamily="34" charset="0"/>
-                        </a:rPr>
-                        <a:t>Reference Datums</a:t>
-                      </a:r>
-                      <a:endParaRPr lang="zh-CN" altLang="en-US" sz="900" b="0" i="0" dirty="0">
-                        <a:latin typeface="Arial" panose="020B0604020202090204" pitchFamily="34" charset="0"/>
-                        <a:ea typeface="宋体" panose="02010600030101010101" pitchFamily="2" charset="-122"/>
-                        <a:cs typeface="Arial" panose="020B0604020202090204" pitchFamily="34" charset="0"/>
-                      </a:endParaRPr>
-                    </a:p>
-                  </a:txBody>
-                  <a:tcPr>
-                    <a:lnL w="6350" cap="flat" cmpd="sng" algn="ctr">
-                      <a:solidFill>
-                        <a:schemeClr val="tx1"/>
-                      </a:solidFill>
-                      <a:prstDash val="solid"/>
-                      <a:round/>
-                      <a:headEnd type="none" w="med" len="med"/>
-                      <a:tailEnd type="none" w="med" len="med"/>
-                    </a:lnL>
-                    <a:lnR w="6350" cap="flat" cmpd="sng" algn="ctr">
-                      <a:solidFill>
-                        <a:schemeClr val="tx1"/>
-                      </a:solidFill>
-                      <a:prstDash val="solid"/>
-                      <a:round/>
-                      <a:headEnd type="none" w="med" len="med"/>
-                      <a:tailEnd type="none" w="med" len="med"/>
-                    </a:lnR>
-                    <a:lnT w="6350" cap="flat" cmpd="sng" algn="ctr">
-                      <a:solidFill>
-                        <a:schemeClr val="tx1"/>
-                      </a:solidFill>
-                      <a:prstDash val="solid"/>
-                      <a:round/>
-                      <a:headEnd type="none" w="med" len="med"/>
-                      <a:tailEnd type="none" w="med" len="med"/>
-                    </a:lnT>
-                    <a:lnB w="6350" cap="flat" cmpd="sng" algn="ctr">
-                      <a:solidFill>
-                        <a:schemeClr val="tx1"/>
-                      </a:solidFill>
-                      <a:prstDash val="solid"/>
-                      <a:round/>
-                      <a:headEnd type="none" w="med" len="med"/>
-                      <a:tailEnd type="none" w="med" len="med"/>
-                    </a:lnB>
-                    <a:lnTlToBr w="12700" cmpd="sng">
-                      <a:noFill/>
-                      <a:prstDash val="solid"/>
-                    </a:lnTlToBr>
-                    <a:lnBlToTr w="12700" cmpd="sng">
-                      <a:noFill/>
-                      <a:prstDash val="solid"/>
-                    </a:lnBlToTr>
-                    <a:solidFill>
-                      <a:schemeClr val="accent5">
-                        <a:lumMod val="60000"/>
-                        <a:lumOff val="40000"/>
-                      </a:schemeClr>
-                    </a:solidFill>
-                  </a:tcPr>
-                </a:tc>
-                <a:tc>
-                  <a:txBody>
-                    <a:bodyPr/>
-                    <a:lstStyle/>
-                    <a:p>
-                      <a:r>
-                        <a:rPr lang="en-US" altLang="zh-CN" sz="900" b="0" i="0" dirty="0">
-                          <a:latin typeface="Arial" panose="020B0604020202090204" pitchFamily="34" charset="0"/>
-                          <a:ea typeface="宋体" panose="02010600030101010101" pitchFamily="2" charset="-122"/>
-                          <a:cs typeface="Arial" panose="020B0604020202090204" pitchFamily="34" charset="0"/>
-                        </a:rPr>
-                        <a:t>A+B+C</a:t>
-                      </a:r>
-                      <a:endParaRPr lang="zh-CN" altLang="en-US" sz="900" b="0" i="0" dirty="0">
-                        <a:latin typeface="Arial" panose="020B0604020202090204" pitchFamily="34" charset="0"/>
-                        <a:ea typeface="宋体" panose="02010600030101010101" pitchFamily="2" charset="-122"/>
-                        <a:cs typeface="Arial" panose="020B0604020202090204" pitchFamily="34" charset="0"/>
-                      </a:endParaRPr>
-                    </a:p>
-                  </a:txBody>
-                  <a:tcPr>
-                    <a:lnL w="6350" cap="flat" cmpd="sng" algn="ctr">
-                      <a:solidFill>
-                        <a:schemeClr val="tx1"/>
-                      </a:solidFill>
-                      <a:prstDash val="solid"/>
-                      <a:round/>
-                      <a:headEnd type="none" w="med" len="med"/>
-                      <a:tailEnd type="none" w="med" len="med"/>
-                    </a:lnL>
-                    <a:lnR w="6350" cap="flat" cmpd="sng" algn="ctr">
-                      <a:solidFill>
-                        <a:schemeClr val="tx1"/>
-                      </a:solidFill>
-                      <a:prstDash val="solid"/>
-                      <a:round/>
-                      <a:headEnd type="none" w="med" len="med"/>
-                      <a:tailEnd type="none" w="med" len="med"/>
-                    </a:lnR>
-                    <a:lnT w="6350" cap="flat" cmpd="sng" algn="ctr">
-                      <a:solidFill>
-                        <a:schemeClr val="tx1"/>
-                      </a:solidFill>
-                      <a:prstDash val="solid"/>
-                      <a:round/>
-                      <a:headEnd type="none" w="med" len="med"/>
-                      <a:tailEnd type="none" w="med" len="med"/>
-                    </a:lnT>
-                    <a:lnB w="6350" cap="flat" cmpd="sng" algn="ctr">
-                      <a:solidFill>
-                        <a:schemeClr val="tx1"/>
-                      </a:solidFill>
-                      <a:prstDash val="solid"/>
-                      <a:round/>
-                      <a:headEnd type="none" w="med" len="med"/>
-                      <a:tailEnd type="none" w="med" len="med"/>
-                    </a:lnB>
-                    <a:lnTlToBr w="12700" cmpd="sng">
-                      <a:noFill/>
-                      <a:prstDash val="solid"/>
-                    </a:lnTlToBr>
-                    <a:lnBlToTr w="12700" cmpd="sng">
-                      <a:noFill/>
-                      <a:prstDash val="solid"/>
-                    </a:lnBlToTr>
-                  </a:tcPr>
-                </a:tc>
-              </a:tr>
-              <a:tr h="365129">
-                <a:tc>
-                  <a:txBody>
-                    <a:bodyPr/>
-                    <a:lstStyle/>
-                    <a:p>
-                      <a:r>
-                        <a:rPr lang="en-US" altLang="zh-CN" sz="900" b="0" i="0" dirty="0">
-                          <a:latin typeface="Arial" panose="020B0604020202090204" pitchFamily="34" charset="0"/>
-                          <a:ea typeface="宋体" panose="02010600030101010101" pitchFamily="2" charset="-122"/>
-                          <a:cs typeface="Arial" panose="020B0604020202090204" pitchFamily="34" charset="0"/>
-                        </a:rPr>
-                        <a:t>Reporting Output</a:t>
-                      </a:r>
-                      <a:endParaRPr lang="zh-CN" altLang="en-US" sz="900" b="0" i="0" dirty="0">
-                        <a:latin typeface="Arial" panose="020B0604020202090204" pitchFamily="34" charset="0"/>
-                        <a:ea typeface="宋体" panose="02010600030101010101" pitchFamily="2" charset="-122"/>
-                        <a:cs typeface="Arial" panose="020B0604020202090204" pitchFamily="34" charset="0"/>
-                      </a:endParaRPr>
-                    </a:p>
-                  </a:txBody>
-                  <a:tcPr>
-                    <a:lnL w="6350" cap="flat" cmpd="sng" algn="ctr">
-                      <a:solidFill>
-                        <a:schemeClr val="tx1"/>
-                      </a:solidFill>
-                      <a:prstDash val="solid"/>
-                      <a:round/>
-                      <a:headEnd type="none" w="med" len="med"/>
-                      <a:tailEnd type="none" w="med" len="med"/>
-                    </a:lnL>
-                    <a:lnR w="6350" cap="flat" cmpd="sng" algn="ctr">
-                      <a:solidFill>
-                        <a:schemeClr val="tx1"/>
-                      </a:solidFill>
-                      <a:prstDash val="solid"/>
-                      <a:round/>
-                      <a:headEnd type="none" w="med" len="med"/>
-                      <a:tailEnd type="none" w="med" len="med"/>
-                    </a:lnR>
-                    <a:lnT w="6350" cap="flat" cmpd="sng" algn="ctr">
-                      <a:solidFill>
-                        <a:schemeClr val="tx1"/>
-                      </a:solidFill>
-                      <a:prstDash val="solid"/>
-                      <a:round/>
-                      <a:headEnd type="none" w="med" len="med"/>
-                      <a:tailEnd type="none" w="med" len="med"/>
-                    </a:lnT>
-                    <a:lnB w="6350" cap="flat" cmpd="sng" algn="ctr">
-                      <a:solidFill>
-                        <a:schemeClr val="tx1"/>
-                      </a:solidFill>
-                      <a:prstDash val="solid"/>
-                      <a:round/>
-                      <a:headEnd type="none" w="med" len="med"/>
-                      <a:tailEnd type="none" w="med" len="med"/>
-                    </a:lnB>
-                    <a:lnTlToBr w="12700" cmpd="sng">
-                      <a:noFill/>
-                      <a:prstDash val="solid"/>
-                    </a:lnTlToBr>
-                    <a:lnBlToTr w="12700" cmpd="sng">
-                      <a:noFill/>
-                      <a:prstDash val="solid"/>
-                    </a:lnBlToTr>
-                    <a:solidFill>
-                      <a:schemeClr val="accent5">
-                        <a:lumMod val="60000"/>
-                        <a:lumOff val="40000"/>
-                      </a:schemeClr>
-                    </a:solidFill>
-                  </a:tcPr>
-                </a:tc>
-                <a:tc>
-                  <a:txBody>
-                    <a:bodyPr/>
-                    <a:lstStyle/>
-                    <a:p>
-                      <a:r>
-                        <a:rPr lang="en-US" altLang="zh-CN" sz="900" b="0" i="0" dirty="0">
-                          <a:latin typeface="Arial" panose="020B0604020202090204" pitchFamily="34" charset="0"/>
-                          <a:ea typeface="宋体" panose="02010600030101010101" pitchFamily="2" charset="-122"/>
-                          <a:cs typeface="Arial" panose="020B0604020202090204" pitchFamily="34" charset="0"/>
-                        </a:rPr>
-                        <a:t>3x SPC</a:t>
-                      </a:r>
-                      <a:endParaRPr lang="en-US" altLang="zh-CN" sz="900" b="0" i="0" dirty="0">
-                        <a:latin typeface="Arial" panose="020B0604020202090204" pitchFamily="34" charset="0"/>
-                        <a:ea typeface="宋体" panose="02010600030101010101" pitchFamily="2" charset="-122"/>
-                        <a:cs typeface="Arial" panose="020B0604020202090204" pitchFamily="34" charset="0"/>
-                      </a:endParaRPr>
-                    </a:p>
-                    <a:p>
-                      <a:r>
-                        <a:rPr lang="en-US" altLang="zh-CN" sz="900" b="0" i="0" dirty="0">
-                          <a:latin typeface="Arial" panose="020B0604020202090204" pitchFamily="34" charset="0"/>
-                          <a:ea typeface="宋体" panose="02010600030101010101" pitchFamily="2" charset="-122"/>
-                          <a:cs typeface="Arial" panose="020B0604020202090204" pitchFamily="34" charset="0"/>
-                        </a:rPr>
-                        <a:t>6x raw data</a:t>
-                      </a:r>
-                      <a:endParaRPr lang="zh-CN" altLang="en-US" sz="900" b="0" i="0" dirty="0">
-                        <a:latin typeface="Arial" panose="020B0604020202090204" pitchFamily="34" charset="0"/>
-                        <a:ea typeface="宋体" panose="02010600030101010101" pitchFamily="2" charset="-122"/>
-                        <a:cs typeface="Arial" panose="020B0604020202090204" pitchFamily="34" charset="0"/>
-                      </a:endParaRPr>
-                    </a:p>
-                  </a:txBody>
-                  <a:tcPr>
-                    <a:lnL w="6350" cap="flat" cmpd="sng" algn="ctr">
-                      <a:solidFill>
-                        <a:schemeClr val="tx1"/>
-                      </a:solidFill>
-                      <a:prstDash val="solid"/>
-                      <a:round/>
-                      <a:headEnd type="none" w="med" len="med"/>
-                      <a:tailEnd type="none" w="med" len="med"/>
-                    </a:lnL>
-                    <a:lnR w="6350" cap="flat" cmpd="sng" algn="ctr">
-                      <a:solidFill>
-                        <a:schemeClr val="tx1"/>
-                      </a:solidFill>
-                      <a:prstDash val="solid"/>
-                      <a:round/>
-                      <a:headEnd type="none" w="med" len="med"/>
-                      <a:tailEnd type="none" w="med" len="med"/>
-                    </a:lnR>
-                    <a:lnT w="6350" cap="flat" cmpd="sng" algn="ctr">
-                      <a:solidFill>
-                        <a:schemeClr val="tx1"/>
-                      </a:solidFill>
-                      <a:prstDash val="solid"/>
-                      <a:round/>
-                      <a:headEnd type="none" w="med" len="med"/>
-                      <a:tailEnd type="none" w="med" len="med"/>
-                    </a:lnT>
-                    <a:lnB w="6350" cap="flat" cmpd="sng" algn="ctr">
-                      <a:solidFill>
-                        <a:schemeClr val="tx1"/>
-                      </a:solidFill>
-                      <a:prstDash val="solid"/>
-                      <a:round/>
-                      <a:headEnd type="none" w="med" len="med"/>
-                      <a:tailEnd type="none" w="med" len="med"/>
-                    </a:lnB>
-                    <a:lnTlToBr w="12700" cmpd="sng">
-                      <a:noFill/>
-                      <a:prstDash val="solid"/>
-                    </a:lnTlToBr>
-                    <a:lnBlToTr w="12700" cmpd="sng">
-                      <a:noFill/>
-                      <a:prstDash val="solid"/>
-                    </a:lnBlToTr>
-                  </a:tcPr>
-                </a:tc>
-              </a:tr>
-              <a:tr h="1083075">
-                <a:tc>
-                  <a:txBody>
-                    <a:bodyPr/>
-                    <a:lstStyle/>
-                    <a:p>
-                      <a:r>
-                        <a:rPr lang="en-US" altLang="zh-CN" sz="900" b="0" i="0" dirty="0">
-                          <a:latin typeface="Arial" panose="020B0604020202090204" pitchFamily="34" charset="0"/>
-                          <a:ea typeface="宋体" panose="02010600030101010101" pitchFamily="2" charset="-122"/>
-                          <a:cs typeface="Arial" panose="020B0604020202090204" pitchFamily="34" charset="0"/>
-                        </a:rPr>
-                        <a:t>Measurement Procedure</a:t>
-                      </a:r>
-                      <a:endParaRPr lang="zh-CN" altLang="en-US" sz="900" b="0" i="0" dirty="0">
-                        <a:latin typeface="Arial" panose="020B0604020202090204" pitchFamily="34" charset="0"/>
-                        <a:ea typeface="宋体" panose="02010600030101010101" pitchFamily="2" charset="-122"/>
-                        <a:cs typeface="Arial" panose="020B0604020202090204" pitchFamily="34" charset="0"/>
-                      </a:endParaRPr>
-                    </a:p>
-                  </a:txBody>
-                  <a:tcPr>
-                    <a:lnL w="6350" cap="flat" cmpd="sng" algn="ctr">
-                      <a:solidFill>
-                        <a:schemeClr val="tx1"/>
-                      </a:solidFill>
-                      <a:prstDash val="solid"/>
-                      <a:round/>
-                      <a:headEnd type="none" w="med" len="med"/>
-                      <a:tailEnd type="none" w="med" len="med"/>
-                    </a:lnL>
-                    <a:lnR w="6350" cap="flat" cmpd="sng" algn="ctr">
-                      <a:solidFill>
-                        <a:schemeClr val="tx1"/>
-                      </a:solidFill>
-                      <a:prstDash val="solid"/>
-                      <a:round/>
-                      <a:headEnd type="none" w="med" len="med"/>
-                      <a:tailEnd type="none" w="med" len="med"/>
-                    </a:lnR>
-                    <a:lnT w="6350" cap="flat" cmpd="sng" algn="ctr">
-                      <a:solidFill>
-                        <a:schemeClr val="tx1"/>
-                      </a:solidFill>
-                      <a:prstDash val="solid"/>
-                      <a:round/>
-                      <a:headEnd type="none" w="med" len="med"/>
-                      <a:tailEnd type="none" w="med" len="med"/>
-                    </a:lnT>
-                    <a:lnB w="6350" cap="flat" cmpd="sng" algn="ctr">
-                      <a:solidFill>
-                        <a:schemeClr val="tx1"/>
-                      </a:solidFill>
-                      <a:prstDash val="solid"/>
-                      <a:round/>
-                      <a:headEnd type="none" w="med" len="med"/>
-                      <a:tailEnd type="none" w="med" len="med"/>
-                    </a:lnB>
-                    <a:lnTlToBr w="12700" cmpd="sng">
-                      <a:noFill/>
-                      <a:prstDash val="solid"/>
-                    </a:lnTlToBr>
-                    <a:lnBlToTr w="12700" cmpd="sng">
-                      <a:noFill/>
-                      <a:prstDash val="solid"/>
-                    </a:lnBlToTr>
-                    <a:solidFill>
-                      <a:schemeClr val="accent5">
-                        <a:lumMod val="60000"/>
-                        <a:lumOff val="40000"/>
-                      </a:schemeClr>
-                    </a:solidFill>
-                  </a:tcPr>
-                </a:tc>
-                <a:tc>
-                  <a:txBody>
-                    <a:bodyPr/>
-                    <a:lstStyle/>
-                    <a:p>
-                      <a:r>
-                        <a:rPr lang="en-US" altLang="zh-CN" sz="900" b="0" i="0" dirty="0">
-                          <a:latin typeface="Arial" panose="020B0604020202090204" pitchFamily="34" charset="0"/>
-                          <a:ea typeface="宋体" panose="02010600030101010101" pitchFamily="2" charset="-122"/>
-                          <a:cs typeface="Arial" panose="020B0604020202090204" pitchFamily="34" charset="0"/>
-                        </a:rPr>
-                        <a:t>1. Capture 2 points (S1&amp;S2) as picture right</a:t>
-                      </a:r>
-                      <a:endParaRPr lang="en-US" altLang="zh-CN" sz="900" b="0" i="0" dirty="0">
-                        <a:latin typeface="Arial" panose="020B0604020202090204" pitchFamily="34" charset="0"/>
-                        <a:ea typeface="宋体" panose="02010600030101010101" pitchFamily="2" charset="-122"/>
-                        <a:cs typeface="Arial" panose="020B0604020202090204" pitchFamily="34" charset="0"/>
-                      </a:endParaRPr>
-                    </a:p>
-                  </a:txBody>
-                  <a:tcPr>
-                    <a:lnL w="6350" cap="flat" cmpd="sng" algn="ctr">
-                      <a:solidFill>
-                        <a:schemeClr val="tx1"/>
-                      </a:solidFill>
-                      <a:prstDash val="solid"/>
-                      <a:round/>
-                      <a:headEnd type="none" w="med" len="med"/>
-                      <a:tailEnd type="none" w="med" len="med"/>
-                    </a:lnL>
-                    <a:lnR w="6350" cap="flat" cmpd="sng" algn="ctr">
-                      <a:solidFill>
-                        <a:schemeClr val="tx1"/>
-                      </a:solidFill>
-                      <a:prstDash val="solid"/>
-                      <a:round/>
-                      <a:headEnd type="none" w="med" len="med"/>
-                      <a:tailEnd type="none" w="med" len="med"/>
-                    </a:lnR>
-                    <a:lnT w="6350" cap="flat" cmpd="sng" algn="ctr">
-                      <a:solidFill>
-                        <a:schemeClr val="tx1"/>
-                      </a:solidFill>
-                      <a:prstDash val="solid"/>
-                      <a:round/>
-                      <a:headEnd type="none" w="med" len="med"/>
-                      <a:tailEnd type="none" w="med" len="med"/>
-                    </a:lnT>
-                    <a:lnB w="6350" cap="flat" cmpd="sng" algn="ctr">
-                      <a:solidFill>
-                        <a:schemeClr val="tx1"/>
-                      </a:solidFill>
-                      <a:prstDash val="solid"/>
-                      <a:round/>
-                      <a:headEnd type="none" w="med" len="med"/>
-                      <a:tailEnd type="none" w="med" len="med"/>
-                    </a:lnB>
-                    <a:lnTlToBr w="12700" cmpd="sng">
-                      <a:noFill/>
-                      <a:prstDash val="solid"/>
-                    </a:lnTlToBr>
-                    <a:lnBlToTr w="12700" cmpd="sng">
-                      <a:noFill/>
-                      <a:prstDash val="solid"/>
-                    </a:lnBlToTr>
-                  </a:tcPr>
-                </a:tc>
-              </a:tr>
-              <a:tr h="1103970">
-                <a:tc>
-                  <a:txBody>
-                    <a:bodyPr/>
-                    <a:lstStyle/>
-                    <a:p>
-                      <a:r>
-                        <a:rPr lang="en-US" altLang="zh-CN" sz="900" b="0" i="0" dirty="0">
-                          <a:latin typeface="Arial" panose="020B0604020202090204" pitchFamily="34" charset="0"/>
-                          <a:ea typeface="宋体" panose="02010600030101010101" pitchFamily="2" charset="-122"/>
-                          <a:cs typeface="Arial" panose="020B0604020202090204" pitchFamily="34" charset="0"/>
-                        </a:rPr>
-                        <a:t>Calculation Method</a:t>
-                      </a:r>
-                      <a:endParaRPr lang="zh-CN" altLang="en-US" sz="900" b="0" i="0" dirty="0">
-                        <a:latin typeface="Arial" panose="020B0604020202090204" pitchFamily="34" charset="0"/>
-                        <a:ea typeface="宋体" panose="02010600030101010101" pitchFamily="2" charset="-122"/>
-                        <a:cs typeface="Arial" panose="020B0604020202090204" pitchFamily="34" charset="0"/>
-                      </a:endParaRPr>
-                    </a:p>
-                  </a:txBody>
-                  <a:tcPr>
-                    <a:lnL w="6350" cap="flat" cmpd="sng" algn="ctr">
-                      <a:solidFill>
-                        <a:schemeClr val="tx1"/>
-                      </a:solidFill>
-                      <a:prstDash val="solid"/>
-                      <a:round/>
-                      <a:headEnd type="none" w="med" len="med"/>
-                      <a:tailEnd type="none" w="med" len="med"/>
-                    </a:lnL>
-                    <a:lnR w="6350" cap="flat" cmpd="sng" algn="ctr">
-                      <a:solidFill>
-                        <a:schemeClr val="tx1"/>
-                      </a:solidFill>
-                      <a:prstDash val="solid"/>
-                      <a:round/>
-                      <a:headEnd type="none" w="med" len="med"/>
-                      <a:tailEnd type="none" w="med" len="med"/>
-                    </a:lnR>
-                    <a:lnT w="6350" cap="flat" cmpd="sng" algn="ctr">
-                      <a:solidFill>
-                        <a:schemeClr val="tx1"/>
-                      </a:solidFill>
-                      <a:prstDash val="solid"/>
-                      <a:round/>
-                      <a:headEnd type="none" w="med" len="med"/>
-                      <a:tailEnd type="none" w="med" len="med"/>
-                    </a:lnT>
-                    <a:lnB w="6350" cap="flat" cmpd="sng" algn="ctr">
-                      <a:solidFill>
-                        <a:schemeClr val="tx1"/>
-                      </a:solidFill>
-                      <a:prstDash val="solid"/>
-                      <a:round/>
-                      <a:headEnd type="none" w="med" len="med"/>
-                      <a:tailEnd type="none" w="med" len="med"/>
-                    </a:lnB>
-                    <a:lnTlToBr w="12700" cmpd="sng">
-                      <a:noFill/>
-                      <a:prstDash val="solid"/>
-                    </a:lnTlToBr>
-                    <a:lnBlToTr w="12700" cmpd="sng">
-                      <a:noFill/>
-                      <a:prstDash val="solid"/>
-                    </a:lnBlToTr>
-                    <a:solidFill>
-                      <a:schemeClr val="accent5">
-                        <a:lumMod val="60000"/>
-                        <a:lumOff val="40000"/>
-                      </a:schemeClr>
-                    </a:solidFill>
-                  </a:tcPr>
-                </a:tc>
-                <a:tc>
-                  <a:txBody>
-                    <a:bodyPr/>
-                    <a:lstStyle/>
-                    <a:p>
-                      <a:r>
-                        <a:rPr lang="en-US" altLang="zh-CN" sz="900" b="0" i="0" dirty="0">
-                          <a:latin typeface="Arial" panose="020B0604020202090204" pitchFamily="34" charset="0"/>
-                          <a:ea typeface="宋体" panose="02010600030101010101" pitchFamily="2" charset="-122"/>
-                          <a:cs typeface="Arial" panose="020B0604020202090204" pitchFamily="34" charset="0"/>
-                        </a:rPr>
-                        <a:t>1. SPC EX_IXY_5 : Calculate the distance from S1 to S2 in orientation X.</a:t>
-                      </a:r>
-                      <a:endParaRPr lang="en-US" altLang="zh-CN" sz="900" b="0" i="0" dirty="0">
-                        <a:latin typeface="Arial" panose="020B0604020202090204" pitchFamily="34" charset="0"/>
-                        <a:ea typeface="宋体" panose="02010600030101010101" pitchFamily="2" charset="-122"/>
-                        <a:cs typeface="Arial" panose="020B0604020202090204" pitchFamily="34" charset="0"/>
-                      </a:endParaRPr>
-                    </a:p>
-                    <a:p>
-                      <a:r>
-                        <a:rPr lang="en-US" altLang="zh-CN" sz="900" b="0" i="0" dirty="0">
-                          <a:latin typeface="Arial" panose="020B0604020202090204" pitchFamily="34" charset="0"/>
-                          <a:ea typeface="宋体" panose="02010600030101010101" pitchFamily="2" charset="-122"/>
-                          <a:cs typeface="Arial" panose="020B0604020202090204" pitchFamily="34" charset="0"/>
-                        </a:rPr>
-                        <a:t>2. The same method for other locations(IXY_7,IXY_9).</a:t>
-                      </a:r>
-                      <a:endParaRPr lang="en-US" altLang="zh-CN" sz="900" b="0" i="0" dirty="0">
-                        <a:latin typeface="Arial" panose="020B0604020202090204" pitchFamily="34" charset="0"/>
-                        <a:ea typeface="宋体" panose="02010600030101010101" pitchFamily="2" charset="-122"/>
-                        <a:cs typeface="Arial" panose="020B0604020202090204" pitchFamily="34" charset="0"/>
-                      </a:endParaRPr>
-                    </a:p>
-                  </a:txBody>
-                  <a:tcPr>
-                    <a:lnL w="6350" cap="flat" cmpd="sng" algn="ctr">
-                      <a:solidFill>
-                        <a:schemeClr val="tx1"/>
-                      </a:solidFill>
-                      <a:prstDash val="solid"/>
-                      <a:round/>
-                      <a:headEnd type="none" w="med" len="med"/>
-                      <a:tailEnd type="none" w="med" len="med"/>
-                    </a:lnL>
-                    <a:lnR w="6350" cap="flat" cmpd="sng" algn="ctr">
-                      <a:solidFill>
-                        <a:schemeClr val="tx1"/>
-                      </a:solidFill>
-                      <a:prstDash val="solid"/>
-                      <a:round/>
-                      <a:headEnd type="none" w="med" len="med"/>
-                      <a:tailEnd type="none" w="med" len="med"/>
-                    </a:lnR>
-                    <a:lnT w="6350" cap="flat" cmpd="sng" algn="ctr">
-                      <a:solidFill>
-                        <a:schemeClr val="tx1"/>
-                      </a:solidFill>
-                      <a:prstDash val="solid"/>
-                      <a:round/>
-                      <a:headEnd type="none" w="med" len="med"/>
-                      <a:tailEnd type="none" w="med" len="med"/>
-                    </a:lnT>
-                    <a:lnB w="6350" cap="flat" cmpd="sng" algn="ctr">
-                      <a:solidFill>
-                        <a:schemeClr val="tx1"/>
-                      </a:solidFill>
-                      <a:prstDash val="solid"/>
-                      <a:round/>
-                      <a:headEnd type="none" w="med" len="med"/>
-                      <a:tailEnd type="none" w="med" len="med"/>
-                    </a:lnB>
-                    <a:lnTlToBr w="12700" cmpd="sng">
-                      <a:noFill/>
-                      <a:prstDash val="solid"/>
-                    </a:lnTlToBr>
-                    <a:lnBlToTr w="12700" cmpd="sng">
-                      <a:noFill/>
-                      <a:prstDash val="solid"/>
-                    </a:lnBlToTr>
-                  </a:tcPr>
-                </a:tc>
-              </a:tr>
-            </a:tbl>
-          </a:graphicData>
-        </a:graphic>
-      </p:graphicFrame>
-      <p:sp>
-        <p:nvSpPr>
-          <p:cNvPr id="7" name="文本框 6"/>
-          <p:cNvSpPr txBox="1"/>
-          <p:nvPr/>
-        </p:nvSpPr>
-        <p:spPr>
-          <a:xfrm>
-            <a:off x="93918" y="105559"/>
-            <a:ext cx="6096000" cy="369332"/>
-          </a:xfrm>
-          <a:prstGeom prst="rect">
-            <a:avLst/>
-          </a:prstGeom>
-          <a:noFill/>
-        </p:spPr>
-        <p:txBody>
-          <a:bodyPr wrap="square">
-            <a:spAutoFit/>
-          </a:bodyPr>
-          <a:lstStyle/>
-          <a:p>
-            <a:r>
-              <a:rPr lang="zh-CN" altLang="en-US" dirty="0">
-                <a:solidFill>
-                  <a:srgbClr val="0070C0"/>
-                </a:solidFill>
-                <a:latin typeface="Arial" panose="020B0604020202090204" pitchFamily="34" charset="0"/>
-                <a:cs typeface="Arial" panose="020B0604020202090204" pitchFamily="34" charset="0"/>
-              </a:rPr>
-              <a:t>J5</a:t>
-            </a:r>
-            <a:r>
-              <a:rPr lang="en-US" altLang="zh-CN" dirty="0">
-                <a:solidFill>
-                  <a:srgbClr val="0070C0"/>
-                </a:solidFill>
-                <a:latin typeface="Arial" panose="020B0604020202090204" pitchFamily="34" charset="0"/>
-                <a:cs typeface="Arial" panose="020B0604020202090204" pitchFamily="34" charset="0"/>
-              </a:rPr>
-              <a:t>0</a:t>
-            </a:r>
-            <a:r>
-              <a:rPr lang="zh-CN" altLang="en-US" dirty="0">
-                <a:solidFill>
-                  <a:srgbClr val="0070C0"/>
-                </a:solidFill>
-                <a:latin typeface="Arial" panose="020B0604020202090204" pitchFamily="34" charset="0"/>
-                <a:cs typeface="Arial" panose="020B0604020202090204" pitchFamily="34" charset="0"/>
-              </a:rPr>
-              <a:t>7</a:t>
-            </a:r>
-            <a:r>
-              <a:rPr lang="zh-CN" altLang="en-US" dirty="0">
-                <a:latin typeface="Arial" panose="020B0604020202090204" pitchFamily="34" charset="0"/>
-                <a:cs typeface="Arial" panose="020B0604020202090204" pitchFamily="34" charset="0"/>
-              </a:rPr>
-              <a:t> </a:t>
-            </a:r>
-            <a:r>
-              <a:rPr lang="en-US" altLang="zh-CN" dirty="0">
-                <a:latin typeface="Arial" panose="020B0604020202090204" pitchFamily="34" charset="0"/>
-                <a:cs typeface="Arial" panose="020B0604020202090204" pitchFamily="34" charset="0"/>
-              </a:rPr>
-              <a:t>MTD </a:t>
-            </a:r>
-            <a:r>
-              <a:rPr lang="zh-CN" altLang="en-US" dirty="0">
-                <a:latin typeface="Arial" panose="020B0604020202090204" pitchFamily="34" charset="0"/>
-                <a:cs typeface="Arial" panose="020B0604020202090204" pitchFamily="34" charset="0"/>
-              </a:rPr>
-              <a:t>|</a:t>
-            </a:r>
-            <a:r>
-              <a:rPr lang="en-US" altLang="zh-CN" dirty="0">
-                <a:latin typeface="Arial" panose="020B0604020202090204" pitchFamily="34" charset="0"/>
-                <a:cs typeface="Arial" panose="020B0604020202090204" pitchFamily="34" charset="0"/>
-              </a:rPr>
-              <a:t> Details For SPCs</a:t>
-            </a:r>
-            <a:endParaRPr lang="zh-CN" altLang="en-US" dirty="0">
-              <a:latin typeface="Arial" panose="020B0604020202090204" pitchFamily="34" charset="0"/>
-              <a:cs typeface="Arial" panose="020B0604020202090204" pitchFamily="34" charset="0"/>
-            </a:endParaRPr>
-          </a:p>
-        </p:txBody>
-      </p:sp>
-      <p:sp>
-        <p:nvSpPr>
-          <p:cNvPr id="8" name="文本框 7"/>
-          <p:cNvSpPr txBox="1"/>
-          <p:nvPr/>
-        </p:nvSpPr>
-        <p:spPr>
-          <a:xfrm>
-            <a:off x="8902688" y="740689"/>
-            <a:ext cx="1238081" cy="246221"/>
-          </a:xfrm>
-          <a:prstGeom prst="rect">
-            <a:avLst/>
-          </a:prstGeom>
-          <a:noFill/>
-        </p:spPr>
-        <p:txBody>
-          <a:bodyPr wrap="square" rtlCol="0">
-            <a:spAutoFit/>
-          </a:bodyPr>
-          <a:lstStyle/>
-          <a:p>
-            <a:r>
-              <a:rPr kumimoji="1" lang="en-US" altLang="zh-CN" sz="1000" dirty="0">
-                <a:latin typeface="Arial" panose="020B0604020202090204" pitchFamily="34" charset="0"/>
-                <a:cs typeface="Arial" panose="020B0604020202090204" pitchFamily="34" charset="0"/>
-              </a:rPr>
-              <a:t>Fixture</a:t>
-            </a:r>
-            <a:endParaRPr kumimoji="1" lang="zh-CN" altLang="en-US" sz="1000" dirty="0">
-              <a:latin typeface="Arial" panose="020B0604020202090204" pitchFamily="34" charset="0"/>
-              <a:cs typeface="Arial" panose="020B0604020202090204" pitchFamily="34" charset="0"/>
-            </a:endParaRPr>
-          </a:p>
-        </p:txBody>
-      </p:sp>
-      <p:sp>
-        <p:nvSpPr>
-          <p:cNvPr id="9" name="文本框 8"/>
-          <p:cNvSpPr txBox="1"/>
-          <p:nvPr/>
-        </p:nvSpPr>
-        <p:spPr>
-          <a:xfrm>
-            <a:off x="4259177" y="662814"/>
-            <a:ext cx="1238081" cy="246221"/>
-          </a:xfrm>
-          <a:prstGeom prst="rect">
-            <a:avLst/>
-          </a:prstGeom>
-          <a:noFill/>
-        </p:spPr>
-        <p:txBody>
-          <a:bodyPr wrap="square" rtlCol="0">
-            <a:spAutoFit/>
-          </a:bodyPr>
-          <a:lstStyle/>
-          <a:p>
-            <a:r>
-              <a:rPr kumimoji="1" lang="en-US" altLang="zh-CN" sz="1000" dirty="0">
-                <a:latin typeface="Arial" panose="020B0604020202090204" pitchFamily="34" charset="0"/>
-                <a:cs typeface="Arial" panose="020B0604020202090204" pitchFamily="34" charset="0"/>
-              </a:rPr>
-              <a:t>Drawing Callout</a:t>
-            </a:r>
-            <a:endParaRPr kumimoji="1" lang="zh-CN" altLang="en-US" sz="1000" dirty="0">
-              <a:latin typeface="Arial" panose="020B0604020202090204" pitchFamily="34" charset="0"/>
-              <a:cs typeface="Arial" panose="020B0604020202090204" pitchFamily="34" charset="0"/>
-            </a:endParaRPr>
-          </a:p>
-        </p:txBody>
-      </p:sp>
-      <p:sp>
-        <p:nvSpPr>
-          <p:cNvPr id="10" name="文本框 9"/>
-          <p:cNvSpPr txBox="1"/>
-          <p:nvPr/>
-        </p:nvSpPr>
-        <p:spPr>
-          <a:xfrm>
-            <a:off x="4366485" y="2871745"/>
-            <a:ext cx="2016171" cy="246221"/>
-          </a:xfrm>
-          <a:prstGeom prst="rect">
-            <a:avLst/>
-          </a:prstGeom>
-          <a:noFill/>
-        </p:spPr>
-        <p:txBody>
-          <a:bodyPr wrap="square" rtlCol="0">
-            <a:spAutoFit/>
-          </a:bodyPr>
-          <a:lstStyle/>
-          <a:p>
-            <a:r>
-              <a:rPr kumimoji="1" lang="en-US" altLang="zh-CN" sz="1000" dirty="0">
-                <a:latin typeface="Arial" panose="020B0604020202090204" pitchFamily="34" charset="0"/>
-                <a:cs typeface="Arial" panose="020B0604020202090204" pitchFamily="34" charset="0"/>
-              </a:rPr>
-              <a:t>Measurement Description </a:t>
-            </a:r>
-            <a:endParaRPr kumimoji="1" lang="zh-CN" altLang="en-US" sz="1000" dirty="0">
-              <a:latin typeface="Arial" panose="020B0604020202090204" pitchFamily="34" charset="0"/>
-              <a:cs typeface="Arial" panose="020B0604020202090204" pitchFamily="34" charset="0"/>
-            </a:endParaRPr>
-          </a:p>
-        </p:txBody>
-      </p:sp>
-      <p:sp>
-        <p:nvSpPr>
-          <p:cNvPr id="11" name="矩形 10"/>
-          <p:cNvSpPr/>
-          <p:nvPr/>
-        </p:nvSpPr>
-        <p:spPr>
-          <a:xfrm>
-            <a:off x="4160550" y="596268"/>
-            <a:ext cx="7866693" cy="6059906"/>
-          </a:xfrm>
-          <a:prstGeom prst="rect">
-            <a:avLst/>
-          </a:prstGeom>
-          <a:noFill/>
-          <a:ln w="6350">
-            <a:solidFill>
-              <a:schemeClr val="tx1"/>
-            </a:solidFill>
-          </a:ln>
-        </p:spPr>
-        <p:style>
-          <a:lnRef idx="2">
-            <a:schemeClr val="accent1">
-              <a:shade val="50000"/>
-            </a:schemeClr>
-          </a:lnRef>
-          <a:fillRef idx="1">
-            <a:schemeClr val="accent1"/>
-          </a:fillRef>
-          <a:effectRef idx="0">
-            <a:schemeClr val="accent1"/>
-          </a:effectRef>
-          <a:fontRef idx="minor">
-            <a:schemeClr val="lt1"/>
-          </a:fontRef>
-        </p:style>
-        <p:txBody>
-          <a:bodyPr rtlCol="0" anchor="ctr"/>
-          <a:lstStyle/>
-          <a:p>
-            <a:pPr algn="ctr"/>
-            <a:endParaRPr kumimoji="1" lang="zh-CN" altLang="en-US"/>
-          </a:p>
-        </p:txBody>
-      </p:sp>
-      <p:pic>
-        <p:nvPicPr>
-          <p:cNvPr id="2" name="Picture 2"/>
-          <p:cNvPicPr>
-            <a:picLocks noChangeAspect="1" noChangeArrowheads="1"/>
-          </p:cNvPicPr>
-          <p:nvPr/>
-        </p:nvPicPr>
-        <p:blipFill>
-          <a:blip r:embed="rId2">
-            <a:extLst>
-              <a:ext uri="{28A0092B-C50C-407E-A947-70E740481C1C}">
-                <a14:useLocalDpi xmlns:a14="http://schemas.microsoft.com/office/drawing/2010/main" val="0"/>
-              </a:ext>
-            </a:extLst>
-          </a:blip>
-          <a:srcRect/>
-          <a:stretch>
-            <a:fillRect/>
-          </a:stretch>
-        </p:blipFill>
-        <p:spPr bwMode="auto">
-          <a:xfrm>
-            <a:off x="9008906" y="1072390"/>
-            <a:ext cx="2356022" cy="1555425"/>
-          </a:xfrm>
-          <a:prstGeom prst="rect">
-            <a:avLst/>
-          </a:prstGeom>
-          <a:noFill/>
-          <a:ln>
-            <a:noFill/>
-          </a:ln>
-          <a:effectLst/>
-          <a:extLst>
-            <a:ext uri="{909E8E84-426E-40DD-AFC4-6F175D3DCCD1}">
-              <a14:hiddenFill xmlns:a14="http://schemas.microsoft.com/office/drawing/2010/main">
-                <a:solidFill>
-                  <a:schemeClr val="accent1"/>
-                </a:solidFill>
-              </a14:hiddenFill>
-            </a:ext>
-            <a:ext uri="{91240B29-F687-4F45-9708-019B960494DF}">
-              <a14:hiddenLine xmlns:a14="http://schemas.microsoft.com/office/drawing/2010/main" w="9525">
-                <a:solidFill>
-                  <a:schemeClr val="tx1"/>
-                </a:solidFill>
-                <a:miter lim="800000"/>
-                <a:headEnd/>
-                <a:tailEnd/>
-              </a14:hiddenLine>
-            </a:ext>
-            <a:ext uri="{AF507438-7753-43E0-B8FC-AC1667EBCBE1}">
-              <a14:hiddenEffects xmlns:a14="http://schemas.microsoft.com/office/drawing/2010/main">
-                <a:effectLst>
-                  <a:outerShdw dist="35921" dir="2700000" algn="ctr" rotWithShape="0">
-                    <a:schemeClr val="bg2"/>
-                  </a:outerShdw>
-                </a:effectLst>
-              </a14:hiddenEffects>
-            </a:ext>
-          </a:extLst>
-        </p:spPr>
-      </p:pic>
-      <p:pic>
-        <p:nvPicPr>
-          <p:cNvPr id="3" name="图片 2"/>
-          <p:cNvPicPr>
-            <a:picLocks noChangeAspect="1"/>
-          </p:cNvPicPr>
-          <p:nvPr/>
-        </p:nvPicPr>
-        <p:blipFill>
-          <a:blip r:embed="rId3"/>
-          <a:stretch>
-            <a:fillRect/>
-          </a:stretch>
-        </p:blipFill>
-        <p:spPr>
-          <a:xfrm>
-            <a:off x="4559368" y="3117966"/>
-            <a:ext cx="1876762" cy="3430800"/>
-          </a:xfrm>
-          <a:prstGeom prst="rect">
-            <a:avLst/>
-          </a:prstGeom>
-        </p:spPr>
-      </p:pic>
-      <p:pic>
-        <p:nvPicPr>
-          <p:cNvPr id="5" name="图片 4"/>
-          <p:cNvPicPr>
-            <a:picLocks noChangeAspect="1"/>
-          </p:cNvPicPr>
-          <p:nvPr/>
-        </p:nvPicPr>
-        <p:blipFill>
-          <a:blip r:embed="rId4"/>
-          <a:stretch>
-            <a:fillRect/>
-          </a:stretch>
-        </p:blipFill>
-        <p:spPr>
-          <a:xfrm>
-            <a:off x="7416157" y="3274545"/>
-            <a:ext cx="2356022" cy="3225047"/>
-          </a:xfrm>
-          <a:prstGeom prst="rect">
-            <a:avLst/>
-          </a:prstGeom>
-        </p:spPr>
-      </p:pic>
-      <p:pic>
-        <p:nvPicPr>
-          <p:cNvPr id="12" name="图片 11"/>
-          <p:cNvPicPr>
-            <a:picLocks noChangeAspect="1"/>
-          </p:cNvPicPr>
-          <p:nvPr/>
-        </p:nvPicPr>
-        <p:blipFill rotWithShape="1">
-          <a:blip r:embed="rId3"/>
-          <a:srcRect l="44875"/>
-          <a:stretch>
-            <a:fillRect/>
-          </a:stretch>
-        </p:blipFill>
-        <p:spPr>
-          <a:xfrm>
-            <a:off x="5700855" y="780929"/>
-            <a:ext cx="597557" cy="1981609"/>
-          </a:xfrm>
-          <a:prstGeom prst="rect">
-            <a:avLst/>
-          </a:prstGeom>
-        </p:spPr>
-      </p:pic>
-    </p:spTree>
-  </p:cSld>
-  <p:clrMapOvr>
-    <a:masterClrMapping/>
-  </p:clrMapOvr>
-</p:sld>
-</file>
-
 <file path=ppt/tags/tag1.xml><?xml version="1.0" encoding="utf-8"?>
 <p:tagLst xmlns:p="http://schemas.openxmlformats.org/presentationml/2006/main">
   <p:tag name="KSO_WM_UNIT_TABLE_BEAUTIFY" val="smartTable{23ab6606-8e45-4e4a-b7bb-0798d2f6b6e5}"/>
@@ -9667,12 +7498,6 @@
 </file>
 
 <file path=ppt/tags/tag2.xml><?xml version="1.0" encoding="utf-8"?>
-<p:tagLst xmlns:p="http://schemas.openxmlformats.org/presentationml/2006/main">
-  <p:tag name="KSO_WM_UNIT_TABLE_BEAUTIFY" val="smartTable{23ab6606-8e45-4e4a-b7bb-0798d2f6b6e5}"/>
-</p:tagLst>
-</file>
-
-<file path=ppt/tags/tag3.xml><?xml version="1.0" encoding="utf-8"?>
 <p:tagLst xmlns:p="http://schemas.openxmlformats.org/presentationml/2006/main">
   <p:tag name="KSO_WM_UNIT_TABLE_BEAUTIFY" val="smartTable{23ab6606-8e45-4e4a-b7bb-0798d2f6b6e5}"/>
 </p:tagLst>

</xml_diff>